<commit_message>
add the second progress presentation v2
</commit_message>
<xml_diff>
--- a/Progress' Presentations/Etat d'avancement - S2.pptx
+++ b/Progress' Presentations/Etat d'avancement - S2.pptx
@@ -5,7 +5,7 @@
     <p:sldMasterId id="2147483648" r:id="rId1"/>
   </p:sldMasterIdLst>
   <p:notesMasterIdLst>
-    <p:notesMasterId r:id="rId17"/>
+    <p:notesMasterId r:id="rId16"/>
   </p:notesMasterIdLst>
   <p:sldIdLst>
     <p:sldId id="267" r:id="rId2"/>
@@ -22,7 +22,6 @@
     <p:sldId id="263" r:id="rId13"/>
     <p:sldId id="260" r:id="rId14"/>
     <p:sldId id="286" r:id="rId15"/>
-    <p:sldId id="285" r:id="rId16"/>
   </p:sldIdLst>
   <p:sldSz cx="12192000" cy="6858000"/>
   <p:notesSz cx="6858000" cy="9144000"/>
@@ -8117,6 +8116,68 @@
           </a:effectLst>
         </p:spPr>
       </p:pic>
+      <p:sp>
+        <p:nvSpPr>
+          <p:cNvPr id="12" name="Rectangle 11">
+            <a:extLst>
+              <a:ext uri="{FF2B5EF4-FFF2-40B4-BE49-F238E27FC236}">
+                <a16:creationId xmlns:a16="http://schemas.microsoft.com/office/drawing/2014/main" id="{1A0F3EE2-A06B-4D73-AAC6-A566B6567C53}"/>
+              </a:ext>
+            </a:extLst>
+          </p:cNvPr>
+          <p:cNvSpPr/>
+          <p:nvPr/>
+        </p:nvSpPr>
+        <p:spPr>
+          <a:xfrm>
+            <a:off x="11350171" y="6004117"/>
+            <a:ext cx="914400" cy="914400"/>
+          </a:xfrm>
+          <a:prstGeom prst="rect">
+            <a:avLst/>
+          </a:prstGeom>
+          <a:noFill/>
+          <a:ln>
+            <a:noFill/>
+          </a:ln>
+        </p:spPr>
+        <p:style>
+          <a:lnRef idx="2">
+            <a:schemeClr val="accent1">
+              <a:shade val="50000"/>
+            </a:schemeClr>
+          </a:lnRef>
+          <a:fillRef idx="1">
+            <a:schemeClr val="accent1"/>
+          </a:fillRef>
+          <a:effectRef idx="0">
+            <a:schemeClr val="accent1"/>
+          </a:effectRef>
+          <a:fontRef idx="minor">
+            <a:schemeClr val="lt1"/>
+          </a:fontRef>
+        </p:style>
+        <p:txBody>
+          <a:bodyPr rtlCol="0" anchor="ctr"/>
+          <a:lstStyle/>
+          <a:p>
+            <a:pPr algn="ctr"/>
+            <a:r>
+              <a:rPr lang="en-US" sz="2800" dirty="0">
+                <a:solidFill>
+                  <a:schemeClr val="tx1"/>
+                </a:solidFill>
+              </a:rPr>
+              <a:t>10</a:t>
+            </a:r>
+            <a:endParaRPr lang="fr-FR" sz="2800" dirty="0">
+              <a:solidFill>
+                <a:schemeClr val="tx1"/>
+              </a:solidFill>
+            </a:endParaRPr>
+          </a:p>
+        </p:txBody>
+      </p:sp>
     </p:spTree>
     <p:extLst>
       <p:ext uri="{BB962C8B-B14F-4D97-AF65-F5344CB8AC3E}">
@@ -8690,6 +8751,68 @@
           </a:p>
         </p:txBody>
       </p:sp>
+      <p:sp>
+        <p:nvSpPr>
+          <p:cNvPr id="13" name="Rectangle 12">
+            <a:extLst>
+              <a:ext uri="{FF2B5EF4-FFF2-40B4-BE49-F238E27FC236}">
+                <a16:creationId xmlns:a16="http://schemas.microsoft.com/office/drawing/2014/main" id="{353606D3-F139-41AF-AC2A-A7100FB365F0}"/>
+              </a:ext>
+            </a:extLst>
+          </p:cNvPr>
+          <p:cNvSpPr/>
+          <p:nvPr/>
+        </p:nvSpPr>
+        <p:spPr>
+          <a:xfrm>
+            <a:off x="11350171" y="6004117"/>
+            <a:ext cx="914400" cy="914400"/>
+          </a:xfrm>
+          <a:prstGeom prst="rect">
+            <a:avLst/>
+          </a:prstGeom>
+          <a:noFill/>
+          <a:ln>
+            <a:noFill/>
+          </a:ln>
+        </p:spPr>
+        <p:style>
+          <a:lnRef idx="2">
+            <a:schemeClr val="accent1">
+              <a:shade val="50000"/>
+            </a:schemeClr>
+          </a:lnRef>
+          <a:fillRef idx="1">
+            <a:schemeClr val="accent1"/>
+          </a:fillRef>
+          <a:effectRef idx="0">
+            <a:schemeClr val="accent1"/>
+          </a:effectRef>
+          <a:fontRef idx="minor">
+            <a:schemeClr val="lt1"/>
+          </a:fontRef>
+        </p:style>
+        <p:txBody>
+          <a:bodyPr rtlCol="0" anchor="ctr"/>
+          <a:lstStyle/>
+          <a:p>
+            <a:pPr algn="ctr"/>
+            <a:r>
+              <a:rPr lang="en-US" sz="2800" dirty="0">
+                <a:solidFill>
+                  <a:schemeClr val="tx1"/>
+                </a:solidFill>
+              </a:rPr>
+              <a:t>11</a:t>
+            </a:r>
+            <a:endParaRPr lang="fr-FR" sz="2800" dirty="0">
+              <a:solidFill>
+                <a:schemeClr val="tx1"/>
+              </a:solidFill>
+            </a:endParaRPr>
+          </a:p>
+        </p:txBody>
+      </p:sp>
     </p:spTree>
     <p:extLst>
       <p:ext uri="{BB962C8B-B14F-4D97-AF65-F5344CB8AC3E}">
@@ -11703,6 +11826,68 @@
           </a:p>
         </p:txBody>
       </p:sp>
+      <p:sp>
+        <p:nvSpPr>
+          <p:cNvPr id="70" name="Rectangle 69">
+            <a:extLst>
+              <a:ext uri="{FF2B5EF4-FFF2-40B4-BE49-F238E27FC236}">
+                <a16:creationId xmlns:a16="http://schemas.microsoft.com/office/drawing/2014/main" id="{91F18917-AC0A-40EA-9811-125CF7BB5DC5}"/>
+              </a:ext>
+            </a:extLst>
+          </p:cNvPr>
+          <p:cNvSpPr/>
+          <p:nvPr/>
+        </p:nvSpPr>
+        <p:spPr>
+          <a:xfrm>
+            <a:off x="11350171" y="6004117"/>
+            <a:ext cx="914400" cy="914400"/>
+          </a:xfrm>
+          <a:prstGeom prst="rect">
+            <a:avLst/>
+          </a:prstGeom>
+          <a:noFill/>
+          <a:ln>
+            <a:noFill/>
+          </a:ln>
+        </p:spPr>
+        <p:style>
+          <a:lnRef idx="2">
+            <a:schemeClr val="accent1">
+              <a:shade val="50000"/>
+            </a:schemeClr>
+          </a:lnRef>
+          <a:fillRef idx="1">
+            <a:schemeClr val="accent1"/>
+          </a:fillRef>
+          <a:effectRef idx="0">
+            <a:schemeClr val="accent1"/>
+          </a:effectRef>
+          <a:fontRef idx="minor">
+            <a:schemeClr val="lt1"/>
+          </a:fontRef>
+        </p:style>
+        <p:txBody>
+          <a:bodyPr rtlCol="0" anchor="ctr"/>
+          <a:lstStyle/>
+          <a:p>
+            <a:pPr algn="ctr"/>
+            <a:r>
+              <a:rPr lang="en-US" sz="2800" dirty="0">
+                <a:solidFill>
+                  <a:schemeClr val="tx1"/>
+                </a:solidFill>
+              </a:rPr>
+              <a:t>12</a:t>
+            </a:r>
+            <a:endParaRPr lang="fr-FR" sz="2800" dirty="0">
+              <a:solidFill>
+                <a:schemeClr val="tx1"/>
+              </a:solidFill>
+            </a:endParaRPr>
+          </a:p>
+        </p:txBody>
+      </p:sp>
     </p:spTree>
     <p:extLst>
       <p:ext uri="{BB962C8B-B14F-4D97-AF65-F5344CB8AC3E}">
@@ -12543,6 +12728,68 @@
           </a:p>
         </p:txBody>
       </p:sp>
+      <p:sp>
+        <p:nvSpPr>
+          <p:cNvPr id="23" name="Rectangle 22">
+            <a:extLst>
+              <a:ext uri="{FF2B5EF4-FFF2-40B4-BE49-F238E27FC236}">
+                <a16:creationId xmlns:a16="http://schemas.microsoft.com/office/drawing/2014/main" id="{E34904FF-C8B4-405A-B223-80138BE38580}"/>
+              </a:ext>
+            </a:extLst>
+          </p:cNvPr>
+          <p:cNvSpPr/>
+          <p:nvPr/>
+        </p:nvSpPr>
+        <p:spPr>
+          <a:xfrm>
+            <a:off x="11350171" y="6004117"/>
+            <a:ext cx="914400" cy="914400"/>
+          </a:xfrm>
+          <a:prstGeom prst="rect">
+            <a:avLst/>
+          </a:prstGeom>
+          <a:noFill/>
+          <a:ln>
+            <a:noFill/>
+          </a:ln>
+        </p:spPr>
+        <p:style>
+          <a:lnRef idx="2">
+            <a:schemeClr val="accent1">
+              <a:shade val="50000"/>
+            </a:schemeClr>
+          </a:lnRef>
+          <a:fillRef idx="1">
+            <a:schemeClr val="accent1"/>
+          </a:fillRef>
+          <a:effectRef idx="0">
+            <a:schemeClr val="accent1"/>
+          </a:effectRef>
+          <a:fontRef idx="minor">
+            <a:schemeClr val="lt1"/>
+          </a:fontRef>
+        </p:style>
+        <p:txBody>
+          <a:bodyPr rtlCol="0" anchor="ctr"/>
+          <a:lstStyle/>
+          <a:p>
+            <a:pPr algn="ctr"/>
+            <a:r>
+              <a:rPr lang="en-US" sz="2800" dirty="0">
+                <a:solidFill>
+                  <a:schemeClr val="tx1"/>
+                </a:solidFill>
+              </a:rPr>
+              <a:t>13</a:t>
+            </a:r>
+            <a:endParaRPr lang="fr-FR" sz="2800" dirty="0">
+              <a:solidFill>
+                <a:schemeClr val="tx1"/>
+              </a:solidFill>
+            </a:endParaRPr>
+          </a:p>
+        </p:txBody>
+      </p:sp>
     </p:spTree>
     <p:extLst>
       <p:ext uri="{BB962C8B-B14F-4D97-AF65-F5344CB8AC3E}">
@@ -12588,7 +12835,7 @@
         <p:spPr>
           <a:xfrm>
             <a:off x="0" y="1515000"/>
-            <a:ext cx="12192000" cy="3857100"/>
+            <a:ext cx="12192000" cy="4315904"/>
           </a:xfrm>
           <a:prstGeom prst="rect">
             <a:avLst/>
@@ -12625,298 +12872,6 @@
           </a:p>
         </p:txBody>
       </p:sp>
-      <p:grpSp>
-        <p:nvGrpSpPr>
-          <p:cNvPr id="27" name="Groupe 26">
-            <a:extLst>
-              <a:ext uri="{FF2B5EF4-FFF2-40B4-BE49-F238E27FC236}">
-                <a16:creationId xmlns:a16="http://schemas.microsoft.com/office/drawing/2014/main" id="{FF08C350-2077-4BC5-BF85-A4C6C20CD24C}"/>
-              </a:ext>
-            </a:extLst>
-          </p:cNvPr>
-          <p:cNvGrpSpPr/>
-          <p:nvPr/>
-        </p:nvGrpSpPr>
-        <p:grpSpPr>
-          <a:xfrm>
-            <a:off x="8197000" y="1678248"/>
-            <a:ext cx="3949722" cy="3857101"/>
-            <a:chOff x="8092941" y="1376313"/>
-            <a:chExt cx="3949722" cy="3857101"/>
-          </a:xfrm>
-        </p:grpSpPr>
-        <p:pic>
-          <p:nvPicPr>
-            <p:cNvPr id="30" name="Graphic 2" descr="Computer">
-              <a:extLst>
-                <a:ext uri="{FF2B5EF4-FFF2-40B4-BE49-F238E27FC236}">
-                  <a16:creationId xmlns:a16="http://schemas.microsoft.com/office/drawing/2014/main" id="{91AF791A-ADB6-4CB5-BA0E-E57E27FD2EDD}"/>
-                </a:ext>
-              </a:extLst>
-            </p:cNvPr>
-            <p:cNvPicPr>
-              <a:picLocks noChangeAspect="1"/>
-            </p:cNvPicPr>
-            <p:nvPr/>
-          </p:nvPicPr>
-          <p:blipFill rotWithShape="1">
-            <a:blip r:embed="rId2">
-              <a:extLst>
-                <a:ext uri="{28A0092B-C50C-407E-A947-70E740481C1C}">
-                  <a14:useLocalDpi xmlns:a14="http://schemas.microsoft.com/office/drawing/2010/main" val="0"/>
-                </a:ext>
-                <a:ext uri="{96DAC541-7B7A-43D3-8B79-37D633B846F1}">
-                  <asvg:svgBlip xmlns:asvg="http://schemas.microsoft.com/office/drawing/2016/SVG/main" r:embed="rId3"/>
-                </a:ext>
-              </a:extLst>
-            </a:blip>
-            <a:srcRect l="65816" t="14994" r="-8411" b="17804"/>
-            <a:stretch/>
-          </p:blipFill>
-          <p:spPr>
-            <a:xfrm>
-              <a:off x="10767245" y="2480592"/>
-              <a:ext cx="1275418" cy="2012248"/>
-            </a:xfrm>
-            <a:prstGeom prst="rect">
-              <a:avLst/>
-            </a:prstGeom>
-          </p:spPr>
-        </p:pic>
-        <p:pic>
-          <p:nvPicPr>
-            <p:cNvPr id="31" name="Picture 3">
-              <a:extLst>
-                <a:ext uri="{FF2B5EF4-FFF2-40B4-BE49-F238E27FC236}">
-                  <a16:creationId xmlns:a16="http://schemas.microsoft.com/office/drawing/2014/main" id="{D8926FD0-5DCB-47B0-A2B9-8234A9F45A5C}"/>
-                </a:ext>
-              </a:extLst>
-            </p:cNvPr>
-            <p:cNvPicPr>
-              <a:picLocks noChangeAspect="1"/>
-            </p:cNvPicPr>
-            <p:nvPr/>
-          </p:nvPicPr>
-          <p:blipFill>
-            <a:blip r:embed="rId4"/>
-            <a:stretch>
-              <a:fillRect/>
-            </a:stretch>
-          </p:blipFill>
-          <p:spPr>
-            <a:xfrm>
-              <a:off x="8440438" y="2441751"/>
-              <a:ext cx="2193365" cy="1366649"/>
-            </a:xfrm>
-            <a:prstGeom prst="rect">
-              <a:avLst/>
-            </a:prstGeom>
-          </p:spPr>
-        </p:pic>
-        <p:pic>
-          <p:nvPicPr>
-            <p:cNvPr id="32" name="Graphic 21" descr="Computer">
-              <a:extLst>
-                <a:ext uri="{FF2B5EF4-FFF2-40B4-BE49-F238E27FC236}">
-                  <a16:creationId xmlns:a16="http://schemas.microsoft.com/office/drawing/2014/main" id="{8FE9F308-27A5-4D1B-8CE4-2227C54C2EE3}"/>
-                </a:ext>
-              </a:extLst>
-            </p:cNvPr>
-            <p:cNvPicPr>
-              <a:picLocks noChangeAspect="1"/>
-            </p:cNvPicPr>
-            <p:nvPr/>
-          </p:nvPicPr>
-          <p:blipFill rotWithShape="1">
-            <a:blip r:embed="rId2">
-              <a:extLst>
-                <a:ext uri="{28A0092B-C50C-407E-A947-70E740481C1C}">
-                  <a14:useLocalDpi xmlns:a14="http://schemas.microsoft.com/office/drawing/2010/main" val="0"/>
-                </a:ext>
-                <a:ext uri="{96DAC541-7B7A-43D3-8B79-37D633B846F1}">
-                  <asvg:svgBlip xmlns:asvg="http://schemas.microsoft.com/office/drawing/2016/SVG/main" r:embed="rId3"/>
-                </a:ext>
-              </a:extLst>
-            </a:blip>
-            <a:srcRect r="32191"/>
-            <a:stretch/>
-          </p:blipFill>
-          <p:spPr>
-            <a:xfrm>
-              <a:off x="8092941" y="1376313"/>
-              <a:ext cx="2741741" cy="3857101"/>
-            </a:xfrm>
-            <a:prstGeom prst="rect">
-              <a:avLst/>
-            </a:prstGeom>
-          </p:spPr>
-        </p:pic>
-      </p:grpSp>
-      <p:sp>
-        <p:nvSpPr>
-          <p:cNvPr id="7" name="Rectangle 6">
-            <a:extLst>
-              <a:ext uri="{FF2B5EF4-FFF2-40B4-BE49-F238E27FC236}">
-                <a16:creationId xmlns:a16="http://schemas.microsoft.com/office/drawing/2014/main" id="{9DB97059-FE87-4E9D-B25F-B7B1A12A5528}"/>
-              </a:ext>
-            </a:extLst>
-          </p:cNvPr>
-          <p:cNvSpPr/>
-          <p:nvPr/>
-        </p:nvSpPr>
-        <p:spPr>
-          <a:xfrm>
-            <a:off x="220559" y="4910249"/>
-            <a:ext cx="2885983" cy="707886"/>
-          </a:xfrm>
-          <a:prstGeom prst="rect">
-            <a:avLst/>
-          </a:prstGeom>
-        </p:spPr>
-        <p:txBody>
-          <a:bodyPr wrap="none">
-            <a:spAutoFit/>
-          </a:bodyPr>
-          <a:lstStyle/>
-          <a:p>
-            <a:r>
-              <a:rPr lang="fr-FR" sz="2000" i="1" dirty="0">
-                <a:solidFill>
-                  <a:srgbClr val="24292F"/>
-                </a:solidFill>
-                <a:latin typeface="Times New Roman" panose="02020603050405020304" pitchFamily="18" charset="0"/>
-                <a:cs typeface="Times New Roman" panose="02020603050405020304" pitchFamily="18" charset="0"/>
-              </a:rPr>
-              <a:t>Application client </a:t>
-            </a:r>
-            <a:r>
-              <a:rPr lang="fr-FR" sz="2000" i="1" dirty="0" err="1">
-                <a:solidFill>
-                  <a:srgbClr val="24292F"/>
-                </a:solidFill>
-                <a:latin typeface="Times New Roman" panose="02020603050405020304" pitchFamily="18" charset="0"/>
-                <a:cs typeface="Times New Roman" panose="02020603050405020304" pitchFamily="18" charset="0"/>
-              </a:rPr>
-              <a:t>Traccar</a:t>
-            </a:r>
-            <a:r>
-              <a:rPr lang="fr-FR" sz="2000" i="1" dirty="0">
-                <a:solidFill>
-                  <a:srgbClr val="24292F"/>
-                </a:solidFill>
-                <a:latin typeface="Times New Roman" panose="02020603050405020304" pitchFamily="18" charset="0"/>
-                <a:cs typeface="Times New Roman" panose="02020603050405020304" pitchFamily="18" charset="0"/>
-              </a:rPr>
-              <a:t>
-</a:t>
-            </a:r>
-            <a:endParaRPr lang="fr-FR" sz="2000" i="1" dirty="0">
-              <a:latin typeface="Times New Roman" panose="02020603050405020304" pitchFamily="18" charset="0"/>
-              <a:cs typeface="Times New Roman" panose="02020603050405020304" pitchFamily="18" charset="0"/>
-            </a:endParaRPr>
-          </a:p>
-        </p:txBody>
-      </p:sp>
-      <p:sp>
-        <p:nvSpPr>
-          <p:cNvPr id="10" name="Rectangle 9">
-            <a:extLst>
-              <a:ext uri="{FF2B5EF4-FFF2-40B4-BE49-F238E27FC236}">
-                <a16:creationId xmlns:a16="http://schemas.microsoft.com/office/drawing/2014/main" id="{BF36CDF2-D11D-46DA-BB61-6D325F6CADDC}"/>
-              </a:ext>
-            </a:extLst>
-          </p:cNvPr>
-          <p:cNvSpPr/>
-          <p:nvPr/>
-        </p:nvSpPr>
-        <p:spPr>
-          <a:xfrm>
-            <a:off x="9085460" y="4903724"/>
-            <a:ext cx="1856855" cy="707886"/>
-          </a:xfrm>
-          <a:prstGeom prst="rect">
-            <a:avLst/>
-          </a:prstGeom>
-        </p:spPr>
-        <p:txBody>
-          <a:bodyPr wrap="none">
-            <a:spAutoFit/>
-          </a:bodyPr>
-          <a:lstStyle/>
-          <a:p>
-            <a:r>
-              <a:rPr lang="fr-FR" sz="2000" i="1" dirty="0" err="1">
-                <a:solidFill>
-                  <a:srgbClr val="24292F"/>
-                </a:solidFill>
-                <a:latin typeface="Times New Roman" panose="02020603050405020304" pitchFamily="18" charset="0"/>
-                <a:cs typeface="Times New Roman" panose="02020603050405020304" pitchFamily="18" charset="0"/>
-              </a:rPr>
-              <a:t>Traccar</a:t>
-            </a:r>
-            <a:r>
-              <a:rPr lang="fr-FR" sz="2000" i="1" dirty="0">
-                <a:solidFill>
-                  <a:srgbClr val="24292F"/>
-                </a:solidFill>
-                <a:latin typeface="Times New Roman" panose="02020603050405020304" pitchFamily="18" charset="0"/>
-                <a:cs typeface="Times New Roman" panose="02020603050405020304" pitchFamily="18" charset="0"/>
-              </a:rPr>
-              <a:t> Server  
-</a:t>
-            </a:r>
-            <a:endParaRPr lang="fr-FR" sz="2000" i="1" dirty="0">
-              <a:latin typeface="Times New Roman" panose="02020603050405020304" pitchFamily="18" charset="0"/>
-              <a:cs typeface="Times New Roman" panose="02020603050405020304" pitchFamily="18" charset="0"/>
-            </a:endParaRPr>
-          </a:p>
-        </p:txBody>
-      </p:sp>
-      <p:sp>
-        <p:nvSpPr>
-          <p:cNvPr id="15" name="Rectangle 14">
-            <a:extLst>
-              <a:ext uri="{FF2B5EF4-FFF2-40B4-BE49-F238E27FC236}">
-                <a16:creationId xmlns:a16="http://schemas.microsoft.com/office/drawing/2014/main" id="{EF622F5A-7792-4884-997F-97822869CDF9}"/>
-              </a:ext>
-            </a:extLst>
-          </p:cNvPr>
-          <p:cNvSpPr/>
-          <p:nvPr/>
-        </p:nvSpPr>
-        <p:spPr>
-          <a:xfrm>
-            <a:off x="3627808" y="2979146"/>
-            <a:ext cx="3746538" cy="830997"/>
-          </a:xfrm>
-          <a:prstGeom prst="rect">
-            <a:avLst/>
-          </a:prstGeom>
-        </p:spPr>
-        <p:txBody>
-          <a:bodyPr wrap="none">
-            <a:spAutoFit/>
-          </a:bodyPr>
-          <a:lstStyle/>
-          <a:p>
-            <a:r>
-              <a:rPr lang="fr-FR" sz="2400" i="1" dirty="0">
-                <a:solidFill>
-                  <a:srgbClr val="24292F"/>
-                </a:solidFill>
-                <a:latin typeface="Times New Roman" panose="02020603050405020304" pitchFamily="18" charset="0"/>
-                <a:cs typeface="Times New Roman" panose="02020603050405020304" pitchFamily="18" charset="0"/>
-              </a:rPr>
-              <a:t>Lier l’application au serveur
-</a:t>
-            </a:r>
-            <a:endParaRPr lang="fr-FR" sz="2400" i="1" dirty="0">
-              <a:latin typeface="Times New Roman" panose="02020603050405020304" pitchFamily="18" charset="0"/>
-              <a:cs typeface="Times New Roman" panose="02020603050405020304" pitchFamily="18" charset="0"/>
-            </a:endParaRPr>
-          </a:p>
-        </p:txBody>
-      </p:sp>
       <p:pic>
         <p:nvPicPr>
           <p:cNvPr id="9" name="Image 8">
@@ -12932,11 +12887,11 @@
           <p:nvPr/>
         </p:nvPicPr>
         <p:blipFill rotWithShape="1">
-          <a:blip r:embed="rId5">
+          <a:blip r:embed="rId2">
             <a:extLst>
               <a:ext uri="{BEBA8EAE-BF5A-486C-A8C5-ECC9F3942E4B}">
                 <a14:imgProps xmlns:a14="http://schemas.microsoft.com/office/drawing/2010/main">
-                  <a14:imgLayer r:embed="rId6">
+                  <a14:imgLayer r:embed="rId3">
                     <a14:imgEffect>
                       <a14:sharpenSoften amount="50000"/>
                     </a14:imgEffect>
@@ -13011,211 +12966,6 @@
           </a:p>
         </p:txBody>
       </p:sp>
-      <p:grpSp>
-        <p:nvGrpSpPr>
-          <p:cNvPr id="14" name="Groupe 13">
-            <a:extLst>
-              <a:ext uri="{FF2B5EF4-FFF2-40B4-BE49-F238E27FC236}">
-                <a16:creationId xmlns:a16="http://schemas.microsoft.com/office/drawing/2014/main" id="{6402C773-B47A-4AD3-8E0B-0EF8746BEE5E}"/>
-              </a:ext>
-            </a:extLst>
-          </p:cNvPr>
-          <p:cNvGrpSpPr/>
-          <p:nvPr/>
-        </p:nvGrpSpPr>
-        <p:grpSpPr>
-          <a:xfrm>
-            <a:off x="876411" y="2621252"/>
-            <a:ext cx="1176808" cy="1971092"/>
-            <a:chOff x="546538" y="1511272"/>
-            <a:chExt cx="2564213" cy="4597248"/>
-          </a:xfrm>
-          <a:effectLst>
-            <a:outerShdw blurRad="50800" dist="38100" algn="l" rotWithShape="0">
-              <a:prstClr val="black">
-                <a:alpha val="40000"/>
-              </a:prstClr>
-            </a:outerShdw>
-          </a:effectLst>
-        </p:grpSpPr>
-        <p:pic>
-          <p:nvPicPr>
-            <p:cNvPr id="16" name="Image 15">
-              <a:extLst>
-                <a:ext uri="{FF2B5EF4-FFF2-40B4-BE49-F238E27FC236}">
-                  <a16:creationId xmlns:a16="http://schemas.microsoft.com/office/drawing/2014/main" id="{1E66E264-6753-4EE1-88F4-A02D63361CB9}"/>
-                </a:ext>
-              </a:extLst>
-            </p:cNvPr>
-            <p:cNvPicPr>
-              <a:picLocks noChangeAspect="1"/>
-            </p:cNvPicPr>
-            <p:nvPr/>
-          </p:nvPicPr>
-          <p:blipFill rotWithShape="1">
-            <a:blip r:embed="rId7">
-              <a:extLst>
-                <a:ext uri="{28A0092B-C50C-407E-A947-70E740481C1C}">
-                  <a14:useLocalDpi xmlns:a14="http://schemas.microsoft.com/office/drawing/2010/main" val="0"/>
-                </a:ext>
-              </a:extLst>
-            </a:blip>
-            <a:srcRect b="6353"/>
-            <a:stretch/>
-          </p:blipFill>
-          <p:spPr>
-            <a:xfrm>
-              <a:off x="663680" y="1808313"/>
-              <a:ext cx="2329929" cy="3882368"/>
-            </a:xfrm>
-            <a:prstGeom prst="roundRect">
-              <a:avLst>
-                <a:gd name="adj" fmla="val 8734"/>
-              </a:avLst>
-            </a:prstGeom>
-          </p:spPr>
-        </p:pic>
-        <p:pic>
-          <p:nvPicPr>
-            <p:cNvPr id="17" name="Image 16">
-              <a:extLst>
-                <a:ext uri="{FF2B5EF4-FFF2-40B4-BE49-F238E27FC236}">
-                  <a16:creationId xmlns:a16="http://schemas.microsoft.com/office/drawing/2014/main" id="{FD619BA2-42DF-4DF9-8587-FB56E2194F14}"/>
-                </a:ext>
-              </a:extLst>
-            </p:cNvPr>
-            <p:cNvPicPr>
-              <a:picLocks noChangeAspect="1"/>
-            </p:cNvPicPr>
-            <p:nvPr/>
-          </p:nvPicPr>
-          <p:blipFill rotWithShape="1">
-            <a:blip r:embed="rId8">
-              <a:extLst>
-                <a:ext uri="{28A0092B-C50C-407E-A947-70E740481C1C}">
-                  <a14:useLocalDpi xmlns:a14="http://schemas.microsoft.com/office/drawing/2010/main" val="0"/>
-                </a:ext>
-              </a:extLst>
-            </a:blip>
-            <a:srcRect l="27920" t="9838" r="27594" b="14325"/>
-            <a:stretch/>
-          </p:blipFill>
-          <p:spPr>
-            <a:xfrm>
-              <a:off x="546538" y="1511272"/>
-              <a:ext cx="2564213" cy="4597248"/>
-            </a:xfrm>
-            <a:prstGeom prst="rect">
-              <a:avLst/>
-            </a:prstGeom>
-          </p:spPr>
-        </p:pic>
-      </p:grpSp>
-      <p:grpSp>
-        <p:nvGrpSpPr>
-          <p:cNvPr id="26" name="Groupe 25">
-            <a:extLst>
-              <a:ext uri="{FF2B5EF4-FFF2-40B4-BE49-F238E27FC236}">
-                <a16:creationId xmlns:a16="http://schemas.microsoft.com/office/drawing/2014/main" id="{5D16AB0E-EE32-4ED6-A991-96F6A7C6264F}"/>
-              </a:ext>
-            </a:extLst>
-          </p:cNvPr>
-          <p:cNvGrpSpPr/>
-          <p:nvPr/>
-        </p:nvGrpSpPr>
-        <p:grpSpPr>
-          <a:xfrm>
-            <a:off x="2861947" y="3561021"/>
-            <a:ext cx="5150243" cy="845068"/>
-            <a:chOff x="2679469" y="3027693"/>
-            <a:chExt cx="5150243" cy="845068"/>
-          </a:xfrm>
-        </p:grpSpPr>
-        <p:cxnSp>
-          <p:nvCxnSpPr>
-            <p:cNvPr id="12" name="Straight Arrow Connector 11">
-              <a:extLst>
-                <a:ext uri="{FF2B5EF4-FFF2-40B4-BE49-F238E27FC236}">
-                  <a16:creationId xmlns:a16="http://schemas.microsoft.com/office/drawing/2014/main" id="{CF7EF238-5E5E-4E90-B8F2-A651811A1352}"/>
-                </a:ext>
-              </a:extLst>
-            </p:cNvPr>
-            <p:cNvCxnSpPr>
-              <a:cxnSpLocks/>
-            </p:cNvCxnSpPr>
-            <p:nvPr/>
-          </p:nvCxnSpPr>
-          <p:spPr>
-            <a:xfrm>
-              <a:off x="2679469" y="3595865"/>
-              <a:ext cx="5150243" cy="0"/>
-            </a:xfrm>
-            <a:prstGeom prst="straightConnector1">
-              <a:avLst/>
-            </a:prstGeom>
-            <a:ln w="76200">
-              <a:solidFill>
-                <a:schemeClr val="tx1"/>
-              </a:solidFill>
-              <a:headEnd type="triangle" w="med" len="med"/>
-              <a:tailEnd type="triangle" w="med" len="med"/>
-            </a:ln>
-          </p:spPr>
-          <p:style>
-            <a:lnRef idx="1">
-              <a:schemeClr val="accent1"/>
-            </a:lnRef>
-            <a:fillRef idx="0">
-              <a:schemeClr val="accent1"/>
-            </a:fillRef>
-            <a:effectRef idx="0">
-              <a:schemeClr val="accent1"/>
-            </a:effectRef>
-            <a:fontRef idx="minor">
-              <a:schemeClr val="tx1"/>
-            </a:fontRef>
-          </p:style>
-        </p:cxnSp>
-        <p:pic>
-          <p:nvPicPr>
-            <p:cNvPr id="24" name="Image 23">
-              <a:extLst>
-                <a:ext uri="{FF2B5EF4-FFF2-40B4-BE49-F238E27FC236}">
-                  <a16:creationId xmlns:a16="http://schemas.microsoft.com/office/drawing/2014/main" id="{93E882BA-100C-47B0-B616-570ABAF40B58}"/>
-                </a:ext>
-              </a:extLst>
-            </p:cNvPr>
-            <p:cNvPicPr>
-              <a:picLocks noChangeAspect="1"/>
-            </p:cNvPicPr>
-            <p:nvPr/>
-          </p:nvPicPr>
-          <p:blipFill>
-            <a:blip r:embed="rId9">
-              <a:extLst>
-                <a:ext uri="{28A0092B-C50C-407E-A947-70E740481C1C}">
-                  <a14:useLocalDpi xmlns:a14="http://schemas.microsoft.com/office/drawing/2010/main" val="0"/>
-                </a:ext>
-              </a:extLst>
-            </a:blip>
-            <a:stretch>
-              <a:fillRect/>
-            </a:stretch>
-          </p:blipFill>
-          <p:spPr>
-            <a:xfrm>
-              <a:off x="4489678" y="3027693"/>
-              <a:ext cx="1628789" cy="845068"/>
-            </a:xfrm>
-            <a:prstGeom prst="rect">
-              <a:avLst/>
-            </a:prstGeom>
-            <a:solidFill>
-              <a:srgbClr val="E4EEF8"/>
-            </a:solidFill>
-          </p:spPr>
-        </p:pic>
-      </p:grpSp>
       <p:grpSp>
         <p:nvGrpSpPr>
           <p:cNvPr id="20" name="Groupe 19">
@@ -13309,7 +13059,7 @@
             <p:nvPr/>
           </p:nvPicPr>
           <p:blipFill>
-            <a:blip r:embed="rId10">
+            <a:blip r:embed="rId4">
               <a:extLst>
                 <a:ext uri="{28A0092B-C50C-407E-A947-70E740481C1C}">
                   <a14:useLocalDpi xmlns:a14="http://schemas.microsoft.com/office/drawing/2010/main" val="0"/>
@@ -13383,42 +13133,12 @@
           </a:p>
         </p:txBody>
       </p:sp>
-    </p:spTree>
-    <p:extLst>
-      <p:ext uri="{BB962C8B-B14F-4D97-AF65-F5344CB8AC3E}">
-        <p14:creationId xmlns:p14="http://schemas.microsoft.com/office/powerpoint/2010/main" val="733105927"/>
-      </p:ext>
-    </p:extLst>
-  </p:cSld>
-  <p:clrMapOvr>
-    <a:masterClrMapping/>
-  </p:clrMapOvr>
-</p:sld>
-</file>
-
-<file path=ppt/slides/slide15.xml><?xml version="1.0" encoding="utf-8"?>
-<p:sld xmlns:a="http://schemas.openxmlformats.org/drawingml/2006/main" xmlns:r="http://schemas.openxmlformats.org/officeDocument/2006/relationships" xmlns:p="http://schemas.openxmlformats.org/presentationml/2006/main">
-  <p:cSld>
-    <p:spTree>
-      <p:nvGrpSpPr>
-        <p:cNvPr id="1" name=""/>
-        <p:cNvGrpSpPr/>
-        <p:nvPr/>
-      </p:nvGrpSpPr>
-      <p:grpSpPr>
-        <a:xfrm>
-          <a:off x="0" y="0"/>
-          <a:ext cx="0" cy="0"/>
-          <a:chOff x="0" y="0"/>
-          <a:chExt cx="0" cy="0"/>
-        </a:xfrm>
-      </p:grpSpPr>
       <p:sp>
         <p:nvSpPr>
-          <p:cNvPr id="13" name="Rectangle 12">
+          <p:cNvPr id="2" name="Rectangle 1">
             <a:extLst>
               <a:ext uri="{FF2B5EF4-FFF2-40B4-BE49-F238E27FC236}">
-                <a16:creationId xmlns:a16="http://schemas.microsoft.com/office/drawing/2014/main" id="{09CD3C66-6237-4D56-91C4-9456B279FA3D}"/>
+                <a16:creationId xmlns:a16="http://schemas.microsoft.com/office/drawing/2014/main" id="{C0E28119-3EA2-4D4D-9899-1AC576C1E17A}"/>
               </a:ext>
             </a:extLst>
           </p:cNvPr>
@@ -13427,14 +13147,578 @@
         </p:nvSpPr>
         <p:spPr>
           <a:xfrm>
-            <a:off x="0" y="1841500"/>
-            <a:ext cx="12192000" cy="3530599"/>
+            <a:off x="472728" y="2283881"/>
+            <a:ext cx="3605786" cy="3347662"/>
           </a:xfrm>
           <a:prstGeom prst="rect">
             <a:avLst/>
           </a:prstGeom>
           <a:solidFill>
-            <a:srgbClr val="E4EEF8"/>
+            <a:schemeClr val="bg1"/>
+          </a:solidFill>
+          <a:ln w="28575">
+            <a:solidFill>
+              <a:schemeClr val="accent1">
+                <a:lumMod val="60000"/>
+                <a:lumOff val="40000"/>
+              </a:schemeClr>
+            </a:solidFill>
+            <a:prstDash val="sysDash"/>
+          </a:ln>
+        </p:spPr>
+        <p:style>
+          <a:lnRef idx="2">
+            <a:schemeClr val="accent1">
+              <a:shade val="50000"/>
+            </a:schemeClr>
+          </a:lnRef>
+          <a:fillRef idx="1">
+            <a:schemeClr val="accent1"/>
+          </a:fillRef>
+          <a:effectRef idx="0">
+            <a:schemeClr val="accent1"/>
+          </a:effectRef>
+          <a:fontRef idx="minor">
+            <a:schemeClr val="lt1"/>
+          </a:fontRef>
+        </p:style>
+        <p:txBody>
+          <a:bodyPr rtlCol="0" anchor="ctr"/>
+          <a:lstStyle/>
+          <a:p>
+            <a:pPr algn="ctr"/>
+            <a:endParaRPr lang="fr-FR" dirty="0"/>
+          </a:p>
+        </p:txBody>
+      </p:sp>
+      <p:sp>
+        <p:nvSpPr>
+          <p:cNvPr id="21" name="Rectangle 20">
+            <a:extLst>
+              <a:ext uri="{FF2B5EF4-FFF2-40B4-BE49-F238E27FC236}">
+                <a16:creationId xmlns:a16="http://schemas.microsoft.com/office/drawing/2014/main" id="{FC13298A-447A-484F-914D-88B9A2CDB1B9}"/>
+              </a:ext>
+            </a:extLst>
+          </p:cNvPr>
+          <p:cNvSpPr/>
+          <p:nvPr/>
+        </p:nvSpPr>
+        <p:spPr>
+          <a:xfrm>
+            <a:off x="712447" y="2990105"/>
+            <a:ext cx="3083473" cy="2352881"/>
+          </a:xfrm>
+          <a:prstGeom prst="rect">
+            <a:avLst/>
+          </a:prstGeom>
+          <a:noFill/>
+          <a:ln>
+            <a:solidFill>
+              <a:schemeClr val="bg1">
+                <a:lumMod val="95000"/>
+              </a:schemeClr>
+            </a:solidFill>
+          </a:ln>
+        </p:spPr>
+        <p:style>
+          <a:lnRef idx="2">
+            <a:schemeClr val="accent1">
+              <a:shade val="50000"/>
+            </a:schemeClr>
+          </a:lnRef>
+          <a:fillRef idx="1">
+            <a:schemeClr val="accent1"/>
+          </a:fillRef>
+          <a:effectRef idx="0">
+            <a:schemeClr val="accent1"/>
+          </a:effectRef>
+          <a:fontRef idx="minor">
+            <a:schemeClr val="lt1"/>
+          </a:fontRef>
+        </p:style>
+        <p:txBody>
+          <a:bodyPr rtlCol="0" anchor="ctr"/>
+          <a:lstStyle/>
+          <a:p>
+            <a:pPr algn="ctr"/>
+            <a:endParaRPr lang="fr-FR"/>
+          </a:p>
+        </p:txBody>
+      </p:sp>
+      <p:pic>
+        <p:nvPicPr>
+          <p:cNvPr id="23" name="Picture 2" descr="Afficher l’image source">
+            <a:extLst>
+              <a:ext uri="{FF2B5EF4-FFF2-40B4-BE49-F238E27FC236}">
+                <a16:creationId xmlns:a16="http://schemas.microsoft.com/office/drawing/2014/main" id="{E57A18FD-5B29-47D1-BD1C-96CB74C9D978}"/>
+              </a:ext>
+            </a:extLst>
+          </p:cNvPr>
+          <p:cNvPicPr>
+            <a:picLocks noChangeAspect="1" noChangeArrowheads="1"/>
+          </p:cNvPicPr>
+          <p:nvPr/>
+        </p:nvPicPr>
+        <p:blipFill>
+          <a:blip r:embed="rId5">
+            <a:extLst>
+              <a:ext uri="{28A0092B-C50C-407E-A947-70E740481C1C}">
+                <a14:useLocalDpi xmlns:a14="http://schemas.microsoft.com/office/drawing/2010/main" val="0"/>
+              </a:ext>
+            </a:extLst>
+          </a:blip>
+          <a:srcRect/>
+          <a:stretch>
+            <a:fillRect/>
+          </a:stretch>
+        </p:blipFill>
+        <p:spPr bwMode="auto">
+          <a:xfrm>
+            <a:off x="556914" y="2324869"/>
+            <a:ext cx="457200" cy="457200"/>
+          </a:xfrm>
+          <a:prstGeom prst="rect">
+            <a:avLst/>
+          </a:prstGeom>
+          <a:noFill/>
+          <a:extLst>
+            <a:ext uri="{909E8E84-426E-40DD-AFC4-6F175D3DCCD1}">
+              <a14:hiddenFill xmlns:a14="http://schemas.microsoft.com/office/drawing/2010/main">
+                <a:solidFill>
+                  <a:srgbClr val="FFFFFF"/>
+                </a:solidFill>
+              </a14:hiddenFill>
+            </a:ext>
+          </a:extLst>
+        </p:spPr>
+      </p:pic>
+      <p:pic>
+        <p:nvPicPr>
+          <p:cNvPr id="1026" name="Picture 2" descr="See the source image">
+            <a:extLst>
+              <a:ext uri="{FF2B5EF4-FFF2-40B4-BE49-F238E27FC236}">
+                <a16:creationId xmlns:a16="http://schemas.microsoft.com/office/drawing/2014/main" id="{2F310FAB-38A0-4B3A-821D-5AF59A844FE7}"/>
+              </a:ext>
+            </a:extLst>
+          </p:cNvPr>
+          <p:cNvPicPr>
+            <a:picLocks noChangeAspect="1" noChangeArrowheads="1"/>
+          </p:cNvPicPr>
+          <p:nvPr/>
+        </p:nvPicPr>
+        <p:blipFill>
+          <a:blip r:embed="rId6">
+            <a:extLst>
+              <a:ext uri="{28A0092B-C50C-407E-A947-70E740481C1C}">
+                <a14:useLocalDpi xmlns:a14="http://schemas.microsoft.com/office/drawing/2010/main" val="0"/>
+              </a:ext>
+            </a:extLst>
+          </a:blip>
+          <a:srcRect/>
+          <a:stretch>
+            <a:fillRect/>
+          </a:stretch>
+        </p:blipFill>
+        <p:spPr bwMode="auto">
+          <a:xfrm>
+            <a:off x="817228" y="3099075"/>
+            <a:ext cx="364744" cy="331227"/>
+          </a:xfrm>
+          <a:prstGeom prst="rect">
+            <a:avLst/>
+          </a:prstGeom>
+          <a:noFill/>
+          <a:extLst>
+            <a:ext uri="{909E8E84-426E-40DD-AFC4-6F175D3DCCD1}">
+              <a14:hiddenFill xmlns:a14="http://schemas.microsoft.com/office/drawing/2010/main">
+                <a:solidFill>
+                  <a:srgbClr val="FFFFFF"/>
+                </a:solidFill>
+              </a14:hiddenFill>
+            </a:ext>
+          </a:extLst>
+        </p:spPr>
+      </p:pic>
+      <p:cxnSp>
+        <p:nvCxnSpPr>
+          <p:cNvPr id="18" name="Connecteur droit 17">
+            <a:extLst>
+              <a:ext uri="{FF2B5EF4-FFF2-40B4-BE49-F238E27FC236}">
+                <a16:creationId xmlns:a16="http://schemas.microsoft.com/office/drawing/2014/main" id="{B60427A0-BDC1-4B2E-89FE-99F42CDC9AAD}"/>
+              </a:ext>
+            </a:extLst>
+          </p:cNvPr>
+          <p:cNvCxnSpPr/>
+          <p:nvPr/>
+        </p:nvCxnSpPr>
+        <p:spPr>
+          <a:xfrm>
+            <a:off x="472728" y="2782069"/>
+            <a:ext cx="3605786" cy="0"/>
+          </a:xfrm>
+          <a:prstGeom prst="line">
+            <a:avLst/>
+          </a:prstGeom>
+          <a:ln>
+            <a:solidFill>
+              <a:schemeClr val="accent1">
+                <a:lumMod val="60000"/>
+                <a:lumOff val="40000"/>
+              </a:schemeClr>
+            </a:solidFill>
+          </a:ln>
+        </p:spPr>
+        <p:style>
+          <a:lnRef idx="1">
+            <a:schemeClr val="accent1"/>
+          </a:lnRef>
+          <a:fillRef idx="0">
+            <a:schemeClr val="accent1"/>
+          </a:fillRef>
+          <a:effectRef idx="0">
+            <a:schemeClr val="accent1"/>
+          </a:effectRef>
+          <a:fontRef idx="minor">
+            <a:schemeClr val="tx1"/>
+          </a:fontRef>
+        </p:style>
+      </p:cxnSp>
+      <p:pic>
+        <p:nvPicPr>
+          <p:cNvPr id="34" name="Picture 11">
+            <a:extLst>
+              <a:ext uri="{FF2B5EF4-FFF2-40B4-BE49-F238E27FC236}">
+                <a16:creationId xmlns:a16="http://schemas.microsoft.com/office/drawing/2014/main" id="{9D59C3F9-4DD3-4B89-9CE8-67B3592A7447}"/>
+              </a:ext>
+            </a:extLst>
+          </p:cNvPr>
+          <p:cNvPicPr/>
+          <p:nvPr/>
+        </p:nvPicPr>
+        <p:blipFill rotWithShape="1">
+          <a:blip r:embed="rId7">
+            <a:extLst>
+              <a:ext uri="{28A0092B-C50C-407E-A947-70E740481C1C}">
+                <a14:useLocalDpi xmlns:a14="http://schemas.microsoft.com/office/drawing/2010/main" val="0"/>
+              </a:ext>
+            </a:extLst>
+          </a:blip>
+          <a:srcRect l="1" r="546"/>
+          <a:stretch/>
+        </p:blipFill>
+        <p:spPr>
+          <a:xfrm>
+            <a:off x="1065463" y="4301514"/>
+            <a:ext cx="2377440" cy="640080"/>
+          </a:xfrm>
+          <a:prstGeom prst="rect">
+            <a:avLst/>
+          </a:prstGeom>
+        </p:spPr>
+      </p:pic>
+      <p:grpSp>
+        <p:nvGrpSpPr>
+          <p:cNvPr id="25" name="Groupe 24">
+            <a:extLst>
+              <a:ext uri="{FF2B5EF4-FFF2-40B4-BE49-F238E27FC236}">
+                <a16:creationId xmlns:a16="http://schemas.microsoft.com/office/drawing/2014/main" id="{5621B45F-C286-4465-B642-CBB3C0CC9B0D}"/>
+              </a:ext>
+            </a:extLst>
+          </p:cNvPr>
+          <p:cNvGrpSpPr/>
+          <p:nvPr/>
+        </p:nvGrpSpPr>
+        <p:grpSpPr>
+          <a:xfrm>
+            <a:off x="810364" y="3751159"/>
+            <a:ext cx="2930513" cy="369332"/>
+            <a:chOff x="876411" y="3627152"/>
+            <a:chExt cx="2930513" cy="369332"/>
+          </a:xfrm>
+        </p:grpSpPr>
+        <p:sp>
+          <p:nvSpPr>
+            <p:cNvPr id="22" name="Rectangle 21">
+              <a:extLst>
+                <a:ext uri="{FF2B5EF4-FFF2-40B4-BE49-F238E27FC236}">
+                  <a16:creationId xmlns:a16="http://schemas.microsoft.com/office/drawing/2014/main" id="{05A33EA4-75F9-49CC-8A48-C110C74AE681}"/>
+                </a:ext>
+              </a:extLst>
+            </p:cNvPr>
+            <p:cNvSpPr/>
+            <p:nvPr/>
+          </p:nvSpPr>
+          <p:spPr>
+            <a:xfrm>
+              <a:off x="1372603" y="3627152"/>
+              <a:ext cx="2434321" cy="369332"/>
+            </a:xfrm>
+            <a:prstGeom prst="rect">
+              <a:avLst/>
+            </a:prstGeom>
+          </p:spPr>
+          <p:txBody>
+            <a:bodyPr wrap="none">
+              <a:spAutoFit/>
+            </a:bodyPr>
+            <a:lstStyle/>
+            <a:p>
+              <a:r>
+                <a:rPr lang="fr-FR" b="1" dirty="0">
+                  <a:solidFill>
+                    <a:srgbClr val="DD4814"/>
+                  </a:solidFill>
+                  <a:latin typeface="proxima-nova"/>
+                </a:rPr>
+                <a:t> Ubuntu 20.04 (LTS) x64</a:t>
+              </a:r>
+              <a:endParaRPr lang="fr-FR" b="1" dirty="0">
+                <a:solidFill>
+                  <a:srgbClr val="DD4814"/>
+                </a:solidFill>
+              </a:endParaRPr>
+            </a:p>
+          </p:txBody>
+        </p:sp>
+        <p:pic>
+          <p:nvPicPr>
+            <p:cNvPr id="1028" name="Picture 4" descr="https://cdn.freelogovectors.net/wp-content/uploads/2016/12/ubuntu_logo.png">
+              <a:extLst>
+                <a:ext uri="{FF2B5EF4-FFF2-40B4-BE49-F238E27FC236}">
+                  <a16:creationId xmlns:a16="http://schemas.microsoft.com/office/drawing/2014/main" id="{1909302A-0026-4827-A382-B9D3ED7632BA}"/>
+                </a:ext>
+              </a:extLst>
+            </p:cNvPr>
+            <p:cNvPicPr>
+              <a:picLocks noChangeAspect="1" noChangeArrowheads="1"/>
+            </p:cNvPicPr>
+            <p:nvPr/>
+          </p:nvPicPr>
+          <p:blipFill rotWithShape="1">
+            <a:blip r:embed="rId8">
+              <a:extLst>
+                <a:ext uri="{28A0092B-C50C-407E-A947-70E740481C1C}">
+                  <a14:useLocalDpi xmlns:a14="http://schemas.microsoft.com/office/drawing/2010/main" val="0"/>
+                </a:ext>
+              </a:extLst>
+            </a:blip>
+            <a:srcRect b="34759"/>
+            <a:stretch/>
+          </p:blipFill>
+          <p:spPr bwMode="auto">
+            <a:xfrm>
+              <a:off x="876411" y="3641490"/>
+              <a:ext cx="655852" cy="354994"/>
+            </a:xfrm>
+            <a:prstGeom prst="rect">
+              <a:avLst/>
+            </a:prstGeom>
+            <a:noFill/>
+            <a:extLst>
+              <a:ext uri="{909E8E84-426E-40DD-AFC4-6F175D3DCCD1}">
+                <a14:hiddenFill xmlns:a14="http://schemas.microsoft.com/office/drawing/2010/main">
+                  <a:solidFill>
+                    <a:srgbClr val="FFFFFF"/>
+                  </a:solidFill>
+                </a14:hiddenFill>
+              </a:ext>
+            </a:extLst>
+          </p:spPr>
+        </p:pic>
+      </p:grpSp>
+      <p:cxnSp>
+        <p:nvCxnSpPr>
+          <p:cNvPr id="36" name="Connecteur droit 35">
+            <a:extLst>
+              <a:ext uri="{FF2B5EF4-FFF2-40B4-BE49-F238E27FC236}">
+                <a16:creationId xmlns:a16="http://schemas.microsoft.com/office/drawing/2014/main" id="{6D782770-7C2B-46B3-84F3-4AF511FBF468}"/>
+              </a:ext>
+            </a:extLst>
+          </p:cNvPr>
+          <p:cNvCxnSpPr/>
+          <p:nvPr/>
+        </p:nvCxnSpPr>
+        <p:spPr>
+          <a:xfrm>
+            <a:off x="712447" y="3497944"/>
+            <a:ext cx="3083473" cy="0"/>
+          </a:xfrm>
+          <a:prstGeom prst="line">
+            <a:avLst/>
+          </a:prstGeom>
+          <a:ln>
+            <a:solidFill>
+              <a:schemeClr val="bg1">
+                <a:lumMod val="95000"/>
+              </a:schemeClr>
+            </a:solidFill>
+          </a:ln>
+        </p:spPr>
+        <p:style>
+          <a:lnRef idx="1">
+            <a:schemeClr val="accent1"/>
+          </a:lnRef>
+          <a:fillRef idx="0">
+            <a:schemeClr val="accent1"/>
+          </a:fillRef>
+          <a:effectRef idx="0">
+            <a:schemeClr val="accent1"/>
+          </a:effectRef>
+          <a:fontRef idx="minor">
+            <a:schemeClr val="tx1"/>
+          </a:fontRef>
+        </p:style>
+      </p:cxnSp>
+      <p:sp>
+        <p:nvSpPr>
+          <p:cNvPr id="39" name="Rectangle 38">
+            <a:extLst>
+              <a:ext uri="{FF2B5EF4-FFF2-40B4-BE49-F238E27FC236}">
+                <a16:creationId xmlns:a16="http://schemas.microsoft.com/office/drawing/2014/main" id="{434244D0-0F16-42E2-92FB-4AEBD6096609}"/>
+              </a:ext>
+            </a:extLst>
+          </p:cNvPr>
+          <p:cNvSpPr/>
+          <p:nvPr/>
+        </p:nvSpPr>
+        <p:spPr>
+          <a:xfrm>
+            <a:off x="848325" y="3636918"/>
+            <a:ext cx="2854591" cy="1485205"/>
+          </a:xfrm>
+          <a:prstGeom prst="rect">
+            <a:avLst/>
+          </a:prstGeom>
+          <a:noFill/>
+          <a:ln>
+            <a:solidFill>
+              <a:schemeClr val="bg1">
+                <a:lumMod val="95000"/>
+              </a:schemeClr>
+            </a:solidFill>
+          </a:ln>
+        </p:spPr>
+        <p:style>
+          <a:lnRef idx="2">
+            <a:schemeClr val="accent1">
+              <a:shade val="50000"/>
+            </a:schemeClr>
+          </a:lnRef>
+          <a:fillRef idx="1">
+            <a:schemeClr val="accent1"/>
+          </a:fillRef>
+          <a:effectRef idx="0">
+            <a:schemeClr val="accent1"/>
+          </a:effectRef>
+          <a:fontRef idx="minor">
+            <a:schemeClr val="lt1"/>
+          </a:fontRef>
+        </p:style>
+        <p:txBody>
+          <a:bodyPr rtlCol="0" anchor="ctr"/>
+          <a:lstStyle/>
+          <a:p>
+            <a:pPr algn="ctr"/>
+            <a:endParaRPr lang="fr-FR"/>
+          </a:p>
+        </p:txBody>
+      </p:sp>
+      <p:sp>
+        <p:nvSpPr>
+          <p:cNvPr id="37" name="Rectangle 36">
+            <a:extLst>
+              <a:ext uri="{FF2B5EF4-FFF2-40B4-BE49-F238E27FC236}">
+                <a16:creationId xmlns:a16="http://schemas.microsoft.com/office/drawing/2014/main" id="{F430831C-DD1F-44CF-B41E-AF2A19121D75}"/>
+              </a:ext>
+            </a:extLst>
+          </p:cNvPr>
+          <p:cNvSpPr/>
+          <p:nvPr/>
+        </p:nvSpPr>
+        <p:spPr>
+          <a:xfrm>
+            <a:off x="1148247" y="3086493"/>
+            <a:ext cx="2674515" cy="369332"/>
+          </a:xfrm>
+          <a:prstGeom prst="rect">
+            <a:avLst/>
+          </a:prstGeom>
+        </p:spPr>
+        <p:txBody>
+          <a:bodyPr wrap="none">
+            <a:spAutoFit/>
+          </a:bodyPr>
+          <a:lstStyle/>
+          <a:p>
+            <a:r>
+              <a:rPr lang="fr-FR" b="1" dirty="0">
+                <a:solidFill>
+                  <a:srgbClr val="DD4814"/>
+                </a:solidFill>
+                <a:latin typeface="proxima-nova"/>
+              </a:rPr>
+              <a:t> </a:t>
+            </a:r>
+            <a:r>
+              <a:rPr lang="fr-FR" b="1" dirty="0">
+                <a:solidFill>
+                  <a:srgbClr val="0781FD"/>
+                </a:solidFill>
+                <a:latin typeface="proxima-nova"/>
+              </a:rPr>
+              <a:t>Droplet (Linux </a:t>
+            </a:r>
+            <a:r>
+              <a:rPr lang="en-US" b="1" dirty="0">
+                <a:solidFill>
+                  <a:srgbClr val="0781FD"/>
+                </a:solidFill>
+                <a:latin typeface="proxima-nova"/>
+              </a:rPr>
+              <a:t>based</a:t>
+            </a:r>
+            <a:r>
+              <a:rPr lang="fr-FR" b="1" dirty="0">
+                <a:solidFill>
+                  <a:srgbClr val="0781FD"/>
+                </a:solidFill>
+                <a:latin typeface="proxima-nova"/>
+              </a:rPr>
+              <a:t> VM)</a:t>
+            </a:r>
+            <a:endParaRPr lang="fr-FR" dirty="0">
+              <a:solidFill>
+                <a:srgbClr val="0781FD"/>
+              </a:solidFill>
+            </a:endParaRPr>
+          </a:p>
+        </p:txBody>
+      </p:sp>
+      <p:sp>
+        <p:nvSpPr>
+          <p:cNvPr id="41" name="Flèche : droite rayée 63">
+            <a:extLst>
+              <a:ext uri="{FF2B5EF4-FFF2-40B4-BE49-F238E27FC236}">
+                <a16:creationId xmlns:a16="http://schemas.microsoft.com/office/drawing/2014/main" id="{510BDBEC-39F5-4287-BB16-195017C82DFF}"/>
+              </a:ext>
+            </a:extLst>
+          </p:cNvPr>
+          <p:cNvSpPr/>
+          <p:nvPr/>
+        </p:nvSpPr>
+        <p:spPr>
+          <a:xfrm>
+            <a:off x="4589564" y="3794701"/>
+            <a:ext cx="2814246" cy="276285"/>
+          </a:xfrm>
+          <a:prstGeom prst="stripedRightArrow">
+            <a:avLst>
+              <a:gd name="adj1" fmla="val 50000"/>
+              <a:gd name="adj2" fmla="val 59091"/>
+            </a:avLst>
+          </a:prstGeom>
+          <a:solidFill>
+            <a:srgbClr val="FB9200"/>
           </a:solidFill>
           <a:ln>
             <a:noFill/>
@@ -13461,33 +13745,34 @@
           <a:lstStyle/>
           <a:p>
             <a:pPr algn="ctr"/>
-            <a:endParaRPr lang="fr-FR"/>
+            <a:endParaRPr lang="fr-FR" dirty="0">
+              <a:solidFill>
+                <a:srgbClr val="0070C0"/>
+              </a:solidFill>
+            </a:endParaRPr>
           </a:p>
         </p:txBody>
       </p:sp>
       <p:pic>
         <p:nvPicPr>
-          <p:cNvPr id="9" name="Image 8">
+          <p:cNvPr id="1030" name="Picture 6" descr="See the source image">
             <a:extLst>
               <a:ext uri="{FF2B5EF4-FFF2-40B4-BE49-F238E27FC236}">
-                <a16:creationId xmlns:a16="http://schemas.microsoft.com/office/drawing/2014/main" id="{E662C26D-64FE-4928-8B8A-9763B9DE7A82}"/>
+                <a16:creationId xmlns:a16="http://schemas.microsoft.com/office/drawing/2014/main" id="{AF73070A-B5D7-49B2-BA2A-42D8E8809DB2}"/>
               </a:ext>
             </a:extLst>
           </p:cNvPr>
           <p:cNvPicPr>
-            <a:picLocks noChangeAspect="1"/>
+            <a:picLocks noChangeAspect="1" noChangeArrowheads="1"/>
           </p:cNvPicPr>
           <p:nvPr/>
         </p:nvPicPr>
-        <p:blipFill rotWithShape="1">
-          <a:blip r:embed="rId2">
+        <p:blipFill>
+          <a:blip r:embed="rId9">
             <a:extLst>
               <a:ext uri="{BEBA8EAE-BF5A-486C-A8C5-ECC9F3942E4B}">
                 <a14:imgProps xmlns:a14="http://schemas.microsoft.com/office/drawing/2010/main">
-                  <a14:imgLayer r:embed="rId3">
-                    <a14:imgEffect>
-                      <a14:sharpenSoften amount="50000"/>
-                    </a14:imgEffect>
+                  <a14:imgLayer r:embed="rId10">
                     <a14:imgEffect>
                       <a14:brightnessContrast bright="20000" contrast="-40000"/>
                     </a14:imgEffect>
@@ -13499,25 +13784,37 @@
               </a:ext>
             </a:extLst>
           </a:blip>
-          <a:srcRect l="15230" t="8310" r="14955" b="11489"/>
-          <a:stretch/>
+          <a:srcRect/>
+          <a:stretch>
+            <a:fillRect/>
+          </a:stretch>
         </p:blipFill>
-        <p:spPr>
+        <p:spPr bwMode="auto">
           <a:xfrm>
-            <a:off x="220559" y="220374"/>
-            <a:ext cx="655852" cy="664213"/>
+            <a:off x="5474733" y="2859709"/>
+            <a:ext cx="1011392" cy="1011392"/>
           </a:xfrm>
           <a:prstGeom prst="rect">
             <a:avLst/>
           </a:prstGeom>
+          <a:noFill/>
+          <a:extLst>
+            <a:ext uri="{909E8E84-426E-40DD-AFC4-6F175D3DCCD1}">
+              <a14:hiddenFill xmlns:a14="http://schemas.microsoft.com/office/drawing/2010/main">
+                <a:solidFill>
+                  <a:srgbClr val="FFFFFF"/>
+                </a:solidFill>
+              </a14:hiddenFill>
+            </a:ext>
+          </a:extLst>
         </p:spPr>
       </p:pic>
       <p:sp>
         <p:nvSpPr>
-          <p:cNvPr id="11" name="Rectangle 10">
+          <p:cNvPr id="43" name="Rectangle 42">
             <a:extLst>
               <a:ext uri="{FF2B5EF4-FFF2-40B4-BE49-F238E27FC236}">
-                <a16:creationId xmlns:a16="http://schemas.microsoft.com/office/drawing/2014/main" id="{3BD07A3B-3CF9-46D7-BF75-2ED6E83B5065}"/>
+                <a16:creationId xmlns:a16="http://schemas.microsoft.com/office/drawing/2014/main" id="{A49F1139-E8AB-462A-8830-BFD1CC9E08E6}"/>
               </a:ext>
             </a:extLst>
           </p:cNvPr>
@@ -13526,55 +13823,8 @@
         </p:nvSpPr>
         <p:spPr>
           <a:xfrm>
-            <a:off x="934396" y="337036"/>
-            <a:ext cx="3655168" cy="769441"/>
-          </a:xfrm>
-          <a:prstGeom prst="rect">
-            <a:avLst/>
-          </a:prstGeom>
-        </p:spPr>
-        <p:txBody>
-          <a:bodyPr wrap="none">
-            <a:spAutoFit/>
-          </a:bodyPr>
-          <a:lstStyle/>
-          <a:p>
-            <a:r>
-              <a:rPr lang="en-US" sz="2200" dirty="0">
-                <a:solidFill>
-                  <a:srgbClr val="4466A0"/>
-                </a:solidFill>
-                <a:latin typeface="Aharoni" panose="02010803020104030203" pitchFamily="2" charset="-79"/>
-                <a:ea typeface="Tahoma" panose="020B0604030504040204" pitchFamily="34" charset="0"/>
-                <a:cs typeface="Aharoni" panose="02010803020104030203" pitchFamily="2" charset="-79"/>
-              </a:rPr>
-              <a:t>NIVEAU D’AVANCEMENT :
-</a:t>
-            </a:r>
-            <a:endParaRPr lang="fr-FR" sz="2200" dirty="0">
-              <a:latin typeface="Aharoni" panose="02010803020104030203" pitchFamily="2" charset="-79"/>
-              <a:ea typeface="Tahoma" panose="020B0604030504040204" pitchFamily="34" charset="0"/>
-              <a:cs typeface="Aharoni" panose="02010803020104030203" pitchFamily="2" charset="-79"/>
-            </a:endParaRPr>
-          </a:p>
-        </p:txBody>
-      </p:sp>
-      <p:sp>
-        <p:nvSpPr>
-          <p:cNvPr id="28" name="Rectangle 27">
-            <a:extLst>
-              <a:ext uri="{FF2B5EF4-FFF2-40B4-BE49-F238E27FC236}">
-                <a16:creationId xmlns:a16="http://schemas.microsoft.com/office/drawing/2014/main" id="{2A5764A4-E0D9-4AB0-8612-842605A9EAB8}"/>
-              </a:ext>
-            </a:extLst>
-          </p:cNvPr>
-          <p:cNvSpPr/>
-          <p:nvPr/>
-        </p:nvSpPr>
-        <p:spPr>
-          <a:xfrm>
-            <a:off x="548485" y="1964699"/>
-            <a:ext cx="3247436" cy="954107"/>
+            <a:off x="4788200" y="4110597"/>
+            <a:ext cx="2384458" cy="461665"/>
           </a:xfrm>
           <a:prstGeom prst="rect">
             <a:avLst/>
@@ -13586,79 +13836,30 @@
           </a:bodyPr>
           <a:lstStyle/>
           <a:p>
-            <a:r>
-              <a:rPr lang="fr-FR" sz="2800" dirty="0">
+            <a:pPr algn="ctr"/>
+            <a:r>
+              <a:rPr lang="fr-FR" sz="2400" i="1" dirty="0" err="1">
                 <a:solidFill>
-                  <a:srgbClr val="4466A0"/>
+                  <a:srgbClr val="24292F"/>
                 </a:solidFill>
-                <a:latin typeface="Aharoni" panose="02010803020104030203" pitchFamily="2" charset="-79"/>
-                <a:ea typeface="Tahoma" panose="020B0604030504040204" pitchFamily="34" charset="0"/>
-                <a:cs typeface="Aharoni" panose="02010803020104030203" pitchFamily="2" charset="-79"/>
+                <a:latin typeface="Times New Roman" panose="02020603050405020304" pitchFamily="18" charset="0"/>
+                <a:cs typeface="Times New Roman" panose="02020603050405020304" pitchFamily="18" charset="0"/>
               </a:rPr>
-              <a:t>Étape réalisée:</a:t>
-            </a:r>
-            <a:r>
-              <a:rPr lang="en-US" sz="2800" dirty="0">
-                <a:solidFill>
-                  <a:srgbClr val="4466A0"/>
-                </a:solidFill>
-                <a:latin typeface="Aharoni" panose="02010803020104030203" pitchFamily="2" charset="-79"/>
-                <a:ea typeface="Tahoma" panose="020B0604030504040204" pitchFamily="34" charset="0"/>
-                <a:cs typeface="Aharoni" panose="02010803020104030203" pitchFamily="2" charset="-79"/>
-              </a:rPr>
-              <a:t>
-</a:t>
-            </a:r>
-            <a:endParaRPr lang="fr-FR" sz="2800" dirty="0">
-              <a:latin typeface="Aharoni" panose="02010803020104030203" pitchFamily="2" charset="-79"/>
-              <a:ea typeface="Tahoma" panose="020B0604030504040204" pitchFamily="34" charset="0"/>
-              <a:cs typeface="Aharoni" panose="02010803020104030203" pitchFamily="2" charset="-79"/>
+              <a:t>WebSocket</a:t>
+            </a:r>
+            <a:endParaRPr lang="fr-FR" sz="2400" i="1" dirty="0">
+              <a:latin typeface="Times New Roman" panose="02020603050405020304" pitchFamily="18" charset="0"/>
+              <a:cs typeface="Times New Roman" panose="02020603050405020304" pitchFamily="18" charset="0"/>
             </a:endParaRPr>
           </a:p>
         </p:txBody>
       </p:sp>
-      <p:pic>
-        <p:nvPicPr>
-          <p:cNvPr id="29" name="Image 28">
-            <a:extLst>
-              <a:ext uri="{FF2B5EF4-FFF2-40B4-BE49-F238E27FC236}">
-                <a16:creationId xmlns:a16="http://schemas.microsoft.com/office/drawing/2014/main" id="{267CB79C-3D34-4852-8422-7B5D1F3BF215}"/>
-              </a:ext>
-            </a:extLst>
-          </p:cNvPr>
-          <p:cNvPicPr>
-            <a:picLocks noChangeAspect="1"/>
-          </p:cNvPicPr>
-          <p:nvPr/>
-        </p:nvPicPr>
-        <p:blipFill>
-          <a:blip r:embed="rId4">
-            <a:extLst>
-              <a:ext uri="{28A0092B-C50C-407E-A947-70E740481C1C}">
-                <a14:useLocalDpi xmlns:a14="http://schemas.microsoft.com/office/drawing/2010/main" val="0"/>
-              </a:ext>
-            </a:extLst>
-          </a:blip>
-          <a:stretch>
-            <a:fillRect/>
-          </a:stretch>
-        </p:blipFill>
-        <p:spPr>
-          <a:xfrm>
-            <a:off x="155620" y="2025981"/>
-            <a:ext cx="365760" cy="365760"/>
-          </a:xfrm>
-          <a:prstGeom prst="rect">
-            <a:avLst/>
-          </a:prstGeom>
-        </p:spPr>
-      </p:pic>
       <p:sp>
         <p:nvSpPr>
-          <p:cNvPr id="19" name="Rectangle 18">
+          <p:cNvPr id="38" name="Rectangle : coins arrondis 37">
             <a:extLst>
               <a:ext uri="{FF2B5EF4-FFF2-40B4-BE49-F238E27FC236}">
-                <a16:creationId xmlns:a16="http://schemas.microsoft.com/office/drawing/2014/main" id="{3F0AE283-D957-4A28-8634-CCB047B88246}"/>
+                <a16:creationId xmlns:a16="http://schemas.microsoft.com/office/drawing/2014/main" id="{EE9296FF-18A2-4DBE-9DF6-72915ED1137C}"/>
               </a:ext>
             </a:extLst>
           </p:cNvPr>
@@ -13667,15 +13868,215 @@
         </p:nvSpPr>
         <p:spPr>
           <a:xfrm>
-            <a:off x="0" y="6771394"/>
-            <a:ext cx="12192000" cy="91440"/>
+            <a:off x="7922208" y="2209131"/>
+            <a:ext cx="3506567" cy="3422412"/>
+          </a:xfrm>
+          <a:prstGeom prst="roundRect">
+            <a:avLst>
+              <a:gd name="adj" fmla="val 7761"/>
+            </a:avLst>
+          </a:prstGeom>
+          <a:solidFill>
+            <a:schemeClr val="bg1"/>
+          </a:solidFill>
+          <a:ln w="28575">
+            <a:solidFill>
+              <a:srgbClr val="558E40"/>
+            </a:solidFill>
+          </a:ln>
+        </p:spPr>
+        <p:style>
+          <a:lnRef idx="2">
+            <a:schemeClr val="accent1">
+              <a:shade val="50000"/>
+            </a:schemeClr>
+          </a:lnRef>
+          <a:fillRef idx="1">
+            <a:schemeClr val="accent1"/>
+          </a:fillRef>
+          <a:effectRef idx="0">
+            <a:schemeClr val="accent1"/>
+          </a:effectRef>
+          <a:fontRef idx="minor">
+            <a:schemeClr val="lt1"/>
+          </a:fontRef>
+        </p:style>
+        <p:txBody>
+          <a:bodyPr rtlCol="0" anchor="ctr"/>
+          <a:lstStyle/>
+          <a:p>
+            <a:pPr algn="ctr"/>
+            <a:endParaRPr lang="fr-FR"/>
+          </a:p>
+        </p:txBody>
+      </p:sp>
+      <p:pic>
+        <p:nvPicPr>
+          <p:cNvPr id="1034" name="Picture 10" descr="See the source image">
+            <a:extLst>
+              <a:ext uri="{FF2B5EF4-FFF2-40B4-BE49-F238E27FC236}">
+                <a16:creationId xmlns:a16="http://schemas.microsoft.com/office/drawing/2014/main" id="{12339A2C-D58F-498B-AD7B-8733AA6702AF}"/>
+              </a:ext>
+            </a:extLst>
+          </p:cNvPr>
+          <p:cNvPicPr>
+            <a:picLocks noChangeAspect="1" noChangeArrowheads="1"/>
+          </p:cNvPicPr>
+          <p:nvPr/>
+        </p:nvPicPr>
+        <p:blipFill rotWithShape="1">
+          <a:blip r:embed="rId11">
+            <a:extLst>
+              <a:ext uri="{28A0092B-C50C-407E-A947-70E740481C1C}">
+                <a14:useLocalDpi xmlns:a14="http://schemas.microsoft.com/office/drawing/2010/main" val="0"/>
+              </a:ext>
+            </a:extLst>
+          </a:blip>
+          <a:srcRect l="8702" r="9715"/>
+          <a:stretch/>
+        </p:blipFill>
+        <p:spPr bwMode="auto">
+          <a:xfrm>
+            <a:off x="8450428" y="2176936"/>
+            <a:ext cx="2377440" cy="718784"/>
           </a:xfrm>
           <a:prstGeom prst="rect">
             <a:avLst/>
           </a:prstGeom>
+          <a:noFill/>
+          <a:extLst>
+            <a:ext uri="{909E8E84-426E-40DD-AFC4-6F175D3DCCD1}">
+              <a14:hiddenFill xmlns:a14="http://schemas.microsoft.com/office/drawing/2010/main">
+                <a:solidFill>
+                  <a:srgbClr val="FFFFFF"/>
+                </a:solidFill>
+              </a14:hiddenFill>
+            </a:ext>
+          </a:extLst>
+        </p:spPr>
+      </p:pic>
+      <p:sp>
+        <p:nvSpPr>
+          <p:cNvPr id="47" name="Rectangle : coins arrondis 46">
+            <a:extLst>
+              <a:ext uri="{FF2B5EF4-FFF2-40B4-BE49-F238E27FC236}">
+                <a16:creationId xmlns:a16="http://schemas.microsoft.com/office/drawing/2014/main" id="{1158DCF6-AD33-409B-860A-7D277C05E65A}"/>
+              </a:ext>
+            </a:extLst>
+          </p:cNvPr>
+          <p:cNvSpPr/>
+          <p:nvPr/>
+        </p:nvSpPr>
+        <p:spPr>
+          <a:xfrm>
+            <a:off x="8396081" y="3018368"/>
+            <a:ext cx="2558819" cy="2423043"/>
+          </a:xfrm>
+          <a:prstGeom prst="roundRect">
+            <a:avLst>
+              <a:gd name="adj" fmla="val 7761"/>
+            </a:avLst>
+          </a:prstGeom>
           <a:solidFill>
-            <a:srgbClr val="4466A0"/>
+            <a:schemeClr val="bg1"/>
           </a:solidFill>
+          <a:ln w="28575">
+            <a:solidFill>
+              <a:srgbClr val="558E40"/>
+            </a:solidFill>
+          </a:ln>
+        </p:spPr>
+        <p:style>
+          <a:lnRef idx="2">
+            <a:schemeClr val="accent1">
+              <a:shade val="50000"/>
+            </a:schemeClr>
+          </a:lnRef>
+          <a:fillRef idx="1">
+            <a:schemeClr val="accent1"/>
+          </a:fillRef>
+          <a:effectRef idx="0">
+            <a:schemeClr val="accent1"/>
+          </a:effectRef>
+          <a:fontRef idx="minor">
+            <a:schemeClr val="lt1"/>
+          </a:fontRef>
+        </p:style>
+        <p:txBody>
+          <a:bodyPr rtlCol="0" anchor="ctr"/>
+          <a:lstStyle/>
+          <a:p>
+            <a:pPr algn="ctr"/>
+            <a:endParaRPr lang="fr-FR"/>
+          </a:p>
+        </p:txBody>
+      </p:sp>
+      <p:pic>
+        <p:nvPicPr>
+          <p:cNvPr id="1032" name="Picture 8" descr="See the source image">
+            <a:extLst>
+              <a:ext uri="{FF2B5EF4-FFF2-40B4-BE49-F238E27FC236}">
+                <a16:creationId xmlns:a16="http://schemas.microsoft.com/office/drawing/2014/main" id="{DA4FB8EC-4AB0-49C0-87BA-51C26EAC2FF4}"/>
+              </a:ext>
+            </a:extLst>
+          </p:cNvPr>
+          <p:cNvPicPr>
+            <a:picLocks noChangeAspect="1" noChangeArrowheads="1"/>
+          </p:cNvPicPr>
+          <p:nvPr/>
+        </p:nvPicPr>
+        <p:blipFill rotWithShape="1">
+          <a:blip r:embed="rId12">
+            <a:extLst>
+              <a:ext uri="{28A0092B-C50C-407E-A947-70E740481C1C}">
+                <a14:useLocalDpi xmlns:a14="http://schemas.microsoft.com/office/drawing/2010/main" val="0"/>
+              </a:ext>
+            </a:extLst>
+          </a:blip>
+          <a:srcRect l="10480" t="49297" r="77540" b="20733"/>
+          <a:stretch/>
+        </p:blipFill>
+        <p:spPr bwMode="auto">
+          <a:xfrm>
+            <a:off x="8873931" y="3123853"/>
+            <a:ext cx="1603117" cy="2219133"/>
+          </a:xfrm>
+          <a:prstGeom prst="rect">
+            <a:avLst/>
+          </a:prstGeom>
+          <a:noFill/>
+          <a:extLst>
+            <a:ext uri="{909E8E84-426E-40DD-AFC4-6F175D3DCCD1}">
+              <a14:hiddenFill xmlns:a14="http://schemas.microsoft.com/office/drawing/2010/main">
+                <a:solidFill>
+                  <a:srgbClr val="FFFFFF"/>
+                </a:solidFill>
+              </a14:hiddenFill>
+            </a:ext>
+          </a:extLst>
+        </p:spPr>
+      </p:pic>
+      <p:sp>
+        <p:nvSpPr>
+          <p:cNvPr id="48" name="Rectangle 47">
+            <a:extLst>
+              <a:ext uri="{FF2B5EF4-FFF2-40B4-BE49-F238E27FC236}">
+                <a16:creationId xmlns:a16="http://schemas.microsoft.com/office/drawing/2014/main" id="{3155C19C-DBF2-4AD4-8B7D-54AEEB25279D}"/>
+              </a:ext>
+            </a:extLst>
+          </p:cNvPr>
+          <p:cNvSpPr/>
+          <p:nvPr/>
+        </p:nvSpPr>
+        <p:spPr>
+          <a:xfrm>
+            <a:off x="11350171" y="6004117"/>
+            <a:ext cx="914400" cy="914400"/>
+          </a:xfrm>
+          <a:prstGeom prst="rect">
+            <a:avLst/>
+          </a:prstGeom>
+          <a:noFill/>
           <a:ln>
             <a:noFill/>
           </a:ln>
@@ -13701,584 +14102,18 @@
           <a:lstStyle/>
           <a:p>
             <a:pPr algn="ctr"/>
-            <a:endParaRPr lang="fr-FR"/>
-          </a:p>
-        </p:txBody>
-      </p:sp>
-      <p:pic>
-        <p:nvPicPr>
-          <p:cNvPr id="1026" name="Picture 2" descr="Afficher l’image source">
-            <a:extLst>
-              <a:ext uri="{FF2B5EF4-FFF2-40B4-BE49-F238E27FC236}">
-                <a16:creationId xmlns:a16="http://schemas.microsoft.com/office/drawing/2014/main" id="{832B3601-66F0-4C04-9DA7-23F2A61702E7}"/>
-              </a:ext>
-            </a:extLst>
-          </p:cNvPr>
-          <p:cNvPicPr>
-            <a:picLocks noChangeAspect="1" noChangeArrowheads="1"/>
-          </p:cNvPicPr>
-          <p:nvPr/>
-        </p:nvPicPr>
-        <p:blipFill>
-          <a:blip r:embed="rId5">
-            <a:extLst>
-              <a:ext uri="{28A0092B-C50C-407E-A947-70E740481C1C}">
-                <a14:useLocalDpi xmlns:a14="http://schemas.microsoft.com/office/drawing/2010/main" val="0"/>
-              </a:ext>
-            </a:extLst>
-          </a:blip>
-          <a:srcRect/>
-          <a:stretch>
-            <a:fillRect/>
-          </a:stretch>
-        </p:blipFill>
-        <p:spPr bwMode="auto">
-          <a:xfrm>
-            <a:off x="292377" y="2732218"/>
-            <a:ext cx="1459304" cy="1459304"/>
-          </a:xfrm>
-          <a:prstGeom prst="rect">
-            <a:avLst/>
-          </a:prstGeom>
-          <a:noFill/>
-          <a:extLst>
-            <a:ext uri="{909E8E84-426E-40DD-AFC4-6F175D3DCCD1}">
-              <a14:hiddenFill xmlns:a14="http://schemas.microsoft.com/office/drawing/2010/main">
+            <a:r>
+              <a:rPr lang="en-US" sz="2800" dirty="0">
                 <a:solidFill>
-                  <a:srgbClr val="FFFFFF"/>
+                  <a:schemeClr val="tx1"/>
                 </a:solidFill>
-              </a14:hiddenFill>
-            </a:ext>
-          </a:extLst>
-        </p:spPr>
-      </p:pic>
-      <p:grpSp>
-        <p:nvGrpSpPr>
-          <p:cNvPr id="6" name="Group 5">
-            <a:extLst>
-              <a:ext uri="{FF2B5EF4-FFF2-40B4-BE49-F238E27FC236}">
-                <a16:creationId xmlns:a16="http://schemas.microsoft.com/office/drawing/2014/main" id="{4B701D2B-2624-4674-ABF7-8B98835C35E2}"/>
-              </a:ext>
-            </a:extLst>
-          </p:cNvPr>
-          <p:cNvGrpSpPr/>
-          <p:nvPr/>
-        </p:nvGrpSpPr>
-        <p:grpSpPr>
-          <a:xfrm>
-            <a:off x="2380245" y="2697005"/>
-            <a:ext cx="2209319" cy="1819587"/>
-            <a:chOff x="2236411" y="2686149"/>
-            <a:chExt cx="2209319" cy="1819587"/>
-          </a:xfrm>
-        </p:grpSpPr>
-        <p:grpSp>
-          <p:nvGrpSpPr>
-            <p:cNvPr id="4" name="Group 3">
-              <a:extLst>
-                <a:ext uri="{FF2B5EF4-FFF2-40B4-BE49-F238E27FC236}">
-                  <a16:creationId xmlns:a16="http://schemas.microsoft.com/office/drawing/2014/main" id="{FCE442DA-2FA8-4F4D-895C-6A8B2872D490}"/>
-                </a:ext>
-              </a:extLst>
-            </p:cNvPr>
-            <p:cNvGrpSpPr/>
-            <p:nvPr/>
-          </p:nvGrpSpPr>
-          <p:grpSpPr>
-            <a:xfrm>
-              <a:off x="2529169" y="2686149"/>
-              <a:ext cx="1459303" cy="1459303"/>
-              <a:chOff x="4661823" y="3457872"/>
-              <a:chExt cx="1459303" cy="1459303"/>
-            </a:xfrm>
-          </p:grpSpPr>
-          <p:pic>
-            <p:nvPicPr>
-              <p:cNvPr id="1028" name="Picture 4" descr="Résultat d’images pour Linux Ubuntu">
-                <a:extLst>
-                  <a:ext uri="{FF2B5EF4-FFF2-40B4-BE49-F238E27FC236}">
-                    <a16:creationId xmlns:a16="http://schemas.microsoft.com/office/drawing/2014/main" id="{130AEEF8-8BC7-48D8-BDD2-8A2194C25BCA}"/>
-                  </a:ext>
-                </a:extLst>
-              </p:cNvPr>
-              <p:cNvPicPr>
-                <a:picLocks noChangeAspect="1" noChangeArrowheads="1"/>
-              </p:cNvPicPr>
-              <p:nvPr/>
-            </p:nvPicPr>
-            <p:blipFill rotWithShape="1">
-              <a:blip r:embed="rId6">
-                <a:extLst>
-                  <a:ext uri="{28A0092B-C50C-407E-A947-70E740481C1C}">
-                    <a14:useLocalDpi xmlns:a14="http://schemas.microsoft.com/office/drawing/2010/main" val="0"/>
-                  </a:ext>
-                </a:extLst>
-              </a:blip>
-              <a:srcRect t="19845" r="21844"/>
-              <a:stretch/>
-            </p:blipFill>
-            <p:spPr bwMode="auto">
-              <a:xfrm>
-                <a:off x="4918213" y="3799860"/>
-                <a:ext cx="946521" cy="591836"/>
-              </a:xfrm>
-              <a:prstGeom prst="rect">
-                <a:avLst/>
-              </a:prstGeom>
-              <a:noFill/>
-              <a:extLst>
-                <a:ext uri="{909E8E84-426E-40DD-AFC4-6F175D3DCCD1}">
-                  <a14:hiddenFill xmlns:a14="http://schemas.microsoft.com/office/drawing/2010/main">
-                    <a:solidFill>
-                      <a:srgbClr val="FFFFFF"/>
-                    </a:solidFill>
-                  </a14:hiddenFill>
-                </a:ext>
-              </a:extLst>
-            </p:spPr>
-          </p:pic>
-          <p:pic>
-            <p:nvPicPr>
-              <p:cNvPr id="3" name="Graphic 2" descr="Laptop">
-                <a:extLst>
-                  <a:ext uri="{FF2B5EF4-FFF2-40B4-BE49-F238E27FC236}">
-                    <a16:creationId xmlns:a16="http://schemas.microsoft.com/office/drawing/2014/main" id="{BE202DB7-A857-4E70-B1BF-5F6886116E4D}"/>
-                  </a:ext>
-                </a:extLst>
-              </p:cNvPr>
-              <p:cNvPicPr>
-                <a:picLocks noChangeAspect="1"/>
-              </p:cNvPicPr>
-              <p:nvPr/>
-            </p:nvPicPr>
-            <p:blipFill>
-              <a:blip r:embed="rId7">
-                <a:extLst>
-                  <a:ext uri="{28A0092B-C50C-407E-A947-70E740481C1C}">
-                    <a14:useLocalDpi xmlns:a14="http://schemas.microsoft.com/office/drawing/2010/main" val="0"/>
-                  </a:ext>
-                  <a:ext uri="{96DAC541-7B7A-43D3-8B79-37D633B846F1}">
-                    <asvg:svgBlip xmlns:asvg="http://schemas.microsoft.com/office/drawing/2016/SVG/main" r:embed="rId8"/>
-                  </a:ext>
-                </a:extLst>
-              </a:blip>
-              <a:stretch>
-                <a:fillRect/>
-              </a:stretch>
-            </p:blipFill>
-            <p:spPr>
-              <a:xfrm>
-                <a:off x="4661823" y="3457872"/>
-                <a:ext cx="1459303" cy="1459303"/>
-              </a:xfrm>
-              <a:prstGeom prst="rect">
-                <a:avLst/>
-              </a:prstGeom>
-            </p:spPr>
-          </p:pic>
-        </p:grpSp>
-        <p:sp>
-          <p:nvSpPr>
-            <p:cNvPr id="22" name="Rectangle 21">
-              <a:extLst>
-                <a:ext uri="{FF2B5EF4-FFF2-40B4-BE49-F238E27FC236}">
-                  <a16:creationId xmlns:a16="http://schemas.microsoft.com/office/drawing/2014/main" id="{4C180689-7C0E-4166-9AB9-F3C698BF2C7E}"/>
-                </a:ext>
-              </a:extLst>
-            </p:cNvPr>
-            <p:cNvSpPr/>
-            <p:nvPr/>
-          </p:nvSpPr>
-          <p:spPr>
-            <a:xfrm>
-              <a:off x="2236411" y="3951738"/>
-              <a:ext cx="2209319" cy="553998"/>
-            </a:xfrm>
-            <a:prstGeom prst="rect">
-              <a:avLst/>
-            </a:prstGeom>
-          </p:spPr>
-          <p:txBody>
-            <a:bodyPr wrap="square">
-              <a:spAutoFit/>
-            </a:bodyPr>
-            <a:lstStyle/>
-            <a:p>
-              <a:pPr algn="ctr"/>
-              <a:r>
-                <a:rPr lang="en-US" sz="1500" i="1" dirty="0" err="1">
-                  <a:latin typeface="Times New Roman" panose="02020603050405020304" pitchFamily="18" charset="0"/>
-                  <a:cs typeface="Times New Roman" panose="02020603050405020304" pitchFamily="18" charset="0"/>
-                </a:rPr>
-                <a:t>Intaller</a:t>
-              </a:r>
-              <a:r>
-                <a:rPr lang="en-US" sz="1500" i="1" dirty="0">
-                  <a:latin typeface="Times New Roman" panose="02020603050405020304" pitchFamily="18" charset="0"/>
-                  <a:cs typeface="Times New Roman" panose="02020603050405020304" pitchFamily="18" charset="0"/>
-                </a:rPr>
-                <a:t> </a:t>
-              </a:r>
-              <a:r>
-                <a:rPr lang="en-US" sz="1500" i="1" dirty="0" err="1">
-                  <a:latin typeface="Times New Roman" panose="02020603050405020304" pitchFamily="18" charset="0"/>
-                  <a:cs typeface="Times New Roman" panose="02020603050405020304" pitchFamily="18" charset="0"/>
-                </a:rPr>
-                <a:t>serveur</a:t>
-              </a:r>
-              <a:r>
-                <a:rPr lang="en-US" sz="1500" i="1" dirty="0">
-                  <a:latin typeface="Times New Roman" panose="02020603050405020304" pitchFamily="18" charset="0"/>
-                  <a:cs typeface="Times New Roman" panose="02020603050405020304" pitchFamily="18" charset="0"/>
-                </a:rPr>
-                <a:t> traccar sur </a:t>
-              </a:r>
-              <a:r>
-                <a:rPr lang="en-US" sz="1500" i="1" dirty="0" err="1">
-                  <a:latin typeface="Times New Roman" panose="02020603050405020304" pitchFamily="18" charset="0"/>
-                  <a:cs typeface="Times New Roman" panose="02020603050405020304" pitchFamily="18" charset="0"/>
-                </a:rPr>
-                <a:t>une</a:t>
-              </a:r>
-              <a:r>
-                <a:rPr lang="en-US" sz="1500" i="1" dirty="0">
-                  <a:latin typeface="Times New Roman" panose="02020603050405020304" pitchFamily="18" charset="0"/>
-                  <a:cs typeface="Times New Roman" panose="02020603050405020304" pitchFamily="18" charset="0"/>
-                </a:rPr>
-                <a:t> machine </a:t>
-              </a:r>
-              <a:r>
-                <a:rPr lang="en-US" sz="1500" i="1" dirty="0" err="1">
-                  <a:latin typeface="Times New Roman" panose="02020603050405020304" pitchFamily="18" charset="0"/>
-                  <a:cs typeface="Times New Roman" panose="02020603050405020304" pitchFamily="18" charset="0"/>
-                </a:rPr>
-                <a:t>linux</a:t>
-              </a:r>
-              <a:endParaRPr lang="fr-FR" sz="1500" i="1" dirty="0">
-                <a:latin typeface="Times New Roman" panose="02020603050405020304" pitchFamily="18" charset="0"/>
-                <a:cs typeface="Times New Roman" panose="02020603050405020304" pitchFamily="18" charset="0"/>
-              </a:endParaRPr>
-            </a:p>
-          </p:txBody>
-        </p:sp>
-        <p:pic>
-          <p:nvPicPr>
-            <p:cNvPr id="35" name="Picture 34">
-              <a:extLst>
-                <a:ext uri="{FF2B5EF4-FFF2-40B4-BE49-F238E27FC236}">
-                  <a16:creationId xmlns:a16="http://schemas.microsoft.com/office/drawing/2014/main" id="{CE77DB09-5B1E-4EAA-816A-D70AAECAADBF}"/>
-                </a:ext>
-              </a:extLst>
-            </p:cNvPr>
-            <p:cNvPicPr/>
-            <p:nvPr/>
-          </p:nvPicPr>
-          <p:blipFill rotWithShape="1">
-            <a:blip r:embed="rId9">
-              <a:extLst>
-                <a:ext uri="{28A0092B-C50C-407E-A947-70E740481C1C}">
-                  <a14:useLocalDpi xmlns:a14="http://schemas.microsoft.com/office/drawing/2010/main" val="0"/>
-                </a:ext>
-              </a:extLst>
-            </a:blip>
-            <a:srcRect r="68627"/>
-            <a:stretch/>
-          </p:blipFill>
-          <p:spPr>
-            <a:xfrm>
-              <a:off x="3341071" y="2732218"/>
-              <a:ext cx="782018" cy="591836"/>
-            </a:xfrm>
-            <a:prstGeom prst="rect">
-              <a:avLst/>
-            </a:prstGeom>
-          </p:spPr>
-        </p:pic>
-      </p:grpSp>
-      <p:sp>
-        <p:nvSpPr>
-          <p:cNvPr id="36" name="Rectangle 35">
-            <a:extLst>
-              <a:ext uri="{FF2B5EF4-FFF2-40B4-BE49-F238E27FC236}">
-                <a16:creationId xmlns:a16="http://schemas.microsoft.com/office/drawing/2014/main" id="{A56A4CDA-70C8-44E3-AC80-DAC651BB4CC8}"/>
-              </a:ext>
-            </a:extLst>
-          </p:cNvPr>
-          <p:cNvSpPr/>
-          <p:nvPr/>
-        </p:nvSpPr>
-        <p:spPr>
-          <a:xfrm>
-            <a:off x="-82631" y="4708632"/>
-            <a:ext cx="2209319" cy="553998"/>
-          </a:xfrm>
-          <a:prstGeom prst="rect">
-            <a:avLst/>
-          </a:prstGeom>
-        </p:spPr>
-        <p:txBody>
-          <a:bodyPr wrap="square">
-            <a:spAutoFit/>
-          </a:bodyPr>
-          <a:lstStyle/>
-          <a:p>
-            <a:pPr algn="ctr"/>
-            <a:r>
-              <a:rPr lang="en-US" sz="1500" i="1" dirty="0" err="1">
-                <a:latin typeface="Times New Roman" panose="02020603050405020304" pitchFamily="18" charset="0"/>
-                <a:cs typeface="Times New Roman" panose="02020603050405020304" pitchFamily="18" charset="0"/>
               </a:rPr>
-              <a:t>Offrir</a:t>
-            </a:r>
-            <a:r>
-              <a:rPr lang="en-US" sz="1500" i="1" dirty="0">
-                <a:latin typeface="Times New Roman" panose="02020603050405020304" pitchFamily="18" charset="0"/>
-                <a:cs typeface="Times New Roman" panose="02020603050405020304" pitchFamily="18" charset="0"/>
-              </a:rPr>
-              <a:t> </a:t>
-            </a:r>
-            <a:r>
-              <a:rPr lang="en-US" sz="1500" i="1" dirty="0" err="1">
-                <a:latin typeface="Times New Roman" panose="02020603050405020304" pitchFamily="18" charset="0"/>
-                <a:cs typeface="Times New Roman" panose="02020603050405020304" pitchFamily="18" charset="0"/>
-              </a:rPr>
-              <a:t>une</a:t>
-            </a:r>
-            <a:r>
-              <a:rPr lang="en-US" sz="1500" i="1" dirty="0">
-                <a:latin typeface="Times New Roman" panose="02020603050405020304" pitchFamily="18" charset="0"/>
-                <a:cs typeface="Times New Roman" panose="02020603050405020304" pitchFamily="18" charset="0"/>
-              </a:rPr>
-              <a:t> </a:t>
-            </a:r>
-            <a:r>
-              <a:rPr lang="en-US" sz="1500" i="1" dirty="0" err="1">
-                <a:latin typeface="Times New Roman" panose="02020603050405020304" pitchFamily="18" charset="0"/>
-                <a:cs typeface="Times New Roman" panose="02020603050405020304" pitchFamily="18" charset="0"/>
-              </a:rPr>
-              <a:t>adresse</a:t>
-            </a:r>
-            <a:r>
-              <a:rPr lang="en-US" sz="1500" i="1" dirty="0">
-                <a:latin typeface="Times New Roman" panose="02020603050405020304" pitchFamily="18" charset="0"/>
-                <a:cs typeface="Times New Roman" panose="02020603050405020304" pitchFamily="18" charset="0"/>
-              </a:rPr>
-              <a:t> </a:t>
-            </a:r>
-            <a:r>
-              <a:rPr lang="en-US" sz="1500" i="1" dirty="0" err="1">
-                <a:latin typeface="Times New Roman" panose="02020603050405020304" pitchFamily="18" charset="0"/>
-                <a:cs typeface="Times New Roman" panose="02020603050405020304" pitchFamily="18" charset="0"/>
-              </a:rPr>
-              <a:t>ip</a:t>
-            </a:r>
-            <a:r>
-              <a:rPr lang="en-US" sz="1500" i="1" dirty="0">
-                <a:latin typeface="Times New Roman" panose="02020603050405020304" pitchFamily="18" charset="0"/>
-                <a:cs typeface="Times New Roman" panose="02020603050405020304" pitchFamily="18" charset="0"/>
-              </a:rPr>
-              <a:t> public</a:t>
-            </a:r>
-            <a:endParaRPr lang="fr-FR" sz="1500" i="1" dirty="0">
-              <a:latin typeface="Times New Roman" panose="02020603050405020304" pitchFamily="18" charset="0"/>
-              <a:cs typeface="Times New Roman" panose="02020603050405020304" pitchFamily="18" charset="0"/>
-            </a:endParaRPr>
-          </a:p>
-        </p:txBody>
-      </p:sp>
-      <p:sp>
-        <p:nvSpPr>
-          <p:cNvPr id="5" name="Arrow: Down 4">
-            <a:extLst>
-              <a:ext uri="{FF2B5EF4-FFF2-40B4-BE49-F238E27FC236}">
-                <a16:creationId xmlns:a16="http://schemas.microsoft.com/office/drawing/2014/main" id="{65AF76F1-E5BC-4F9D-AE16-262193D1C4D0}"/>
-              </a:ext>
-            </a:extLst>
-          </p:cNvPr>
-          <p:cNvSpPr/>
-          <p:nvPr/>
-        </p:nvSpPr>
-        <p:spPr>
-          <a:xfrm>
-            <a:off x="895028" y="4308236"/>
-            <a:ext cx="148785" cy="356930"/>
-          </a:xfrm>
-          <a:prstGeom prst="downArrow">
-            <a:avLst/>
-          </a:prstGeom>
-        </p:spPr>
-        <p:style>
-          <a:lnRef idx="2">
-            <a:schemeClr val="dk1">
-              <a:shade val="50000"/>
-            </a:schemeClr>
-          </a:lnRef>
-          <a:fillRef idx="1">
-            <a:schemeClr val="dk1"/>
-          </a:fillRef>
-          <a:effectRef idx="0">
-            <a:schemeClr val="dk1"/>
-          </a:effectRef>
-          <a:fontRef idx="minor">
-            <a:schemeClr val="lt1"/>
-          </a:fontRef>
-        </p:style>
-        <p:txBody>
-          <a:bodyPr rtlCol="0" anchor="ctr"/>
-          <a:lstStyle/>
-          <a:p>
-            <a:pPr algn="ctr"/>
-            <a:endParaRPr lang="fr-FR"/>
-          </a:p>
-        </p:txBody>
-      </p:sp>
-      <p:sp>
-        <p:nvSpPr>
-          <p:cNvPr id="37" name="Arrow: Down 36">
-            <a:extLst>
-              <a:ext uri="{FF2B5EF4-FFF2-40B4-BE49-F238E27FC236}">
-                <a16:creationId xmlns:a16="http://schemas.microsoft.com/office/drawing/2014/main" id="{71D29F92-49AB-4CF7-A0B4-3CCD2C8A6B0D}"/>
-              </a:ext>
-            </a:extLst>
-          </p:cNvPr>
-          <p:cNvSpPr/>
-          <p:nvPr/>
-        </p:nvSpPr>
-        <p:spPr>
-          <a:xfrm rot="16200000">
-            <a:off x="4748043" y="3209012"/>
-            <a:ext cx="148785" cy="356930"/>
-          </a:xfrm>
-          <a:prstGeom prst="downArrow">
-            <a:avLst/>
-          </a:prstGeom>
-        </p:spPr>
-        <p:style>
-          <a:lnRef idx="2">
-            <a:schemeClr val="dk1">
-              <a:shade val="50000"/>
-            </a:schemeClr>
-          </a:lnRef>
-          <a:fillRef idx="1">
-            <a:schemeClr val="dk1"/>
-          </a:fillRef>
-          <a:effectRef idx="0">
-            <a:schemeClr val="dk1"/>
-          </a:effectRef>
-          <a:fontRef idx="minor">
-            <a:schemeClr val="lt1"/>
-          </a:fontRef>
-        </p:style>
-        <p:txBody>
-          <a:bodyPr rtlCol="0" anchor="ctr"/>
-          <a:lstStyle/>
-          <a:p>
-            <a:pPr algn="ctr"/>
-            <a:endParaRPr lang="fr-FR"/>
-          </a:p>
-        </p:txBody>
-      </p:sp>
-      <p:sp>
-        <p:nvSpPr>
-          <p:cNvPr id="38" name="Rectangle 37">
-            <a:extLst>
-              <a:ext uri="{FF2B5EF4-FFF2-40B4-BE49-F238E27FC236}">
-                <a16:creationId xmlns:a16="http://schemas.microsoft.com/office/drawing/2014/main" id="{D7DB9552-385A-4E20-85F5-1903B99BB814}"/>
-              </a:ext>
-            </a:extLst>
-          </p:cNvPr>
-          <p:cNvSpPr/>
-          <p:nvPr/>
-        </p:nvSpPr>
-        <p:spPr>
-          <a:xfrm>
-            <a:off x="5208917" y="2484995"/>
-            <a:ext cx="3494668" cy="553998"/>
-          </a:xfrm>
-          <a:prstGeom prst="rect">
-            <a:avLst/>
-          </a:prstGeom>
-        </p:spPr>
-        <p:txBody>
-          <a:bodyPr wrap="square">
-            <a:spAutoFit/>
-          </a:bodyPr>
-          <a:lstStyle/>
-          <a:p>
-            <a:pPr algn="ctr"/>
-            <a:r>
-              <a:rPr lang="en-US" sz="1500" i="1" dirty="0">
-                <a:latin typeface="Times New Roman" panose="02020603050405020304" pitchFamily="18" charset="0"/>
-                <a:cs typeface="Times New Roman" panose="02020603050405020304" pitchFamily="18" charset="0"/>
-              </a:rPr>
-              <a:t>Connecter a </a:t>
-            </a:r>
-            <a:r>
-              <a:rPr lang="en-US" sz="1500" i="1" dirty="0" err="1">
-                <a:latin typeface="Times New Roman" panose="02020603050405020304" pitchFamily="18" charset="0"/>
-                <a:cs typeface="Times New Roman" panose="02020603050405020304" pitchFamily="18" charset="0"/>
-              </a:rPr>
-              <a:t>l’interface</a:t>
-            </a:r>
-            <a:r>
-              <a:rPr lang="en-US" sz="1500" i="1" dirty="0">
-                <a:latin typeface="Times New Roman" panose="02020603050405020304" pitchFamily="18" charset="0"/>
-                <a:cs typeface="Times New Roman" panose="02020603050405020304" pitchFamily="18" charset="0"/>
-              </a:rPr>
-              <a:t> du </a:t>
-            </a:r>
-            <a:r>
-              <a:rPr lang="en-US" sz="1500" i="1" dirty="0" err="1">
-                <a:latin typeface="Times New Roman" panose="02020603050405020304" pitchFamily="18" charset="0"/>
-                <a:cs typeface="Times New Roman" panose="02020603050405020304" pitchFamily="18" charset="0"/>
-              </a:rPr>
-              <a:t>serveur</a:t>
-            </a:r>
-            <a:r>
-              <a:rPr lang="en-US" sz="1500" i="1" dirty="0">
-                <a:latin typeface="Times New Roman" panose="02020603050405020304" pitchFamily="18" charset="0"/>
-                <a:cs typeface="Times New Roman" panose="02020603050405020304" pitchFamily="18" charset="0"/>
-              </a:rPr>
-              <a:t> avec </a:t>
-            </a:r>
-            <a:r>
-              <a:rPr lang="en-US" sz="1500" i="1" dirty="0" err="1">
-                <a:latin typeface="Times New Roman" panose="02020603050405020304" pitchFamily="18" charset="0"/>
-                <a:cs typeface="Times New Roman" panose="02020603050405020304" pitchFamily="18" charset="0"/>
-              </a:rPr>
-              <a:t>l’adresse</a:t>
-            </a:r>
-            <a:r>
-              <a:rPr lang="en-US" sz="1500" i="1" dirty="0">
-                <a:latin typeface="Times New Roman" panose="02020603050405020304" pitchFamily="18" charset="0"/>
-                <a:cs typeface="Times New Roman" panose="02020603050405020304" pitchFamily="18" charset="0"/>
-              </a:rPr>
-              <a:t> </a:t>
-            </a:r>
-            <a:r>
-              <a:rPr lang="en-US" sz="1500" i="1" dirty="0" err="1">
-                <a:latin typeface="Times New Roman" panose="02020603050405020304" pitchFamily="18" charset="0"/>
-                <a:cs typeface="Times New Roman" panose="02020603050405020304" pitchFamily="18" charset="0"/>
-              </a:rPr>
-              <a:t>ip</a:t>
-            </a:r>
-            <a:r>
-              <a:rPr lang="en-US" sz="1500" i="1" dirty="0">
-                <a:latin typeface="Times New Roman" panose="02020603050405020304" pitchFamily="18" charset="0"/>
-                <a:cs typeface="Times New Roman" panose="02020603050405020304" pitchFamily="18" charset="0"/>
-              </a:rPr>
-              <a:t> </a:t>
-            </a:r>
-            <a:r>
-              <a:rPr lang="en-US" sz="1500" i="1" dirty="0" err="1">
-                <a:latin typeface="Times New Roman" panose="02020603050405020304" pitchFamily="18" charset="0"/>
-                <a:cs typeface="Times New Roman" panose="02020603050405020304" pitchFamily="18" charset="0"/>
-              </a:rPr>
-              <a:t>obtenue</a:t>
-            </a:r>
-            <a:endParaRPr lang="fr-FR" sz="1500" i="1" dirty="0">
-              <a:latin typeface="Times New Roman" panose="02020603050405020304" pitchFamily="18" charset="0"/>
-              <a:cs typeface="Times New Roman" panose="02020603050405020304" pitchFamily="18" charset="0"/>
+              <a:t>14</a:t>
+            </a:r>
+            <a:endParaRPr lang="fr-FR" sz="2800" dirty="0">
+              <a:solidFill>
+                <a:schemeClr val="tx1"/>
+              </a:solidFill>
             </a:endParaRPr>
           </a:p>
         </p:txBody>
@@ -14286,7 +14121,7 @@
     </p:spTree>
     <p:extLst>
       <p:ext uri="{BB962C8B-B14F-4D97-AF65-F5344CB8AC3E}">
-        <p14:creationId xmlns:p14="http://schemas.microsoft.com/office/powerpoint/2010/main" val="2987263149"/>
+        <p14:creationId xmlns:p14="http://schemas.microsoft.com/office/powerpoint/2010/main" val="733105927"/>
       </p:ext>
     </p:extLst>
   </p:cSld>
@@ -15635,6 +15470,68 @@
           </a:p>
         </p:txBody>
       </p:sp>
+      <p:sp>
+        <p:nvSpPr>
+          <p:cNvPr id="28" name="Rectangle 27">
+            <a:extLst>
+              <a:ext uri="{FF2B5EF4-FFF2-40B4-BE49-F238E27FC236}">
+                <a16:creationId xmlns:a16="http://schemas.microsoft.com/office/drawing/2014/main" id="{4CF7E217-706D-471C-89CE-828C1C1769EF}"/>
+              </a:ext>
+            </a:extLst>
+          </p:cNvPr>
+          <p:cNvSpPr/>
+          <p:nvPr/>
+        </p:nvSpPr>
+        <p:spPr>
+          <a:xfrm>
+            <a:off x="11350171" y="6004117"/>
+            <a:ext cx="914400" cy="914400"/>
+          </a:xfrm>
+          <a:prstGeom prst="rect">
+            <a:avLst/>
+          </a:prstGeom>
+          <a:noFill/>
+          <a:ln>
+            <a:noFill/>
+          </a:ln>
+        </p:spPr>
+        <p:style>
+          <a:lnRef idx="2">
+            <a:schemeClr val="accent1">
+              <a:shade val="50000"/>
+            </a:schemeClr>
+          </a:lnRef>
+          <a:fillRef idx="1">
+            <a:schemeClr val="accent1"/>
+          </a:fillRef>
+          <a:effectRef idx="0">
+            <a:schemeClr val="accent1"/>
+          </a:effectRef>
+          <a:fontRef idx="minor">
+            <a:schemeClr val="lt1"/>
+          </a:fontRef>
+        </p:style>
+        <p:txBody>
+          <a:bodyPr rtlCol="0" anchor="ctr"/>
+          <a:lstStyle/>
+          <a:p>
+            <a:pPr algn="ctr"/>
+            <a:r>
+              <a:rPr lang="en-US" sz="2800" dirty="0">
+                <a:solidFill>
+                  <a:schemeClr val="tx1"/>
+                </a:solidFill>
+              </a:rPr>
+              <a:t>02</a:t>
+            </a:r>
+            <a:endParaRPr lang="fr-FR" sz="2800" dirty="0">
+              <a:solidFill>
+                <a:schemeClr val="tx1"/>
+              </a:solidFill>
+            </a:endParaRPr>
+          </a:p>
+        </p:txBody>
+      </p:sp>
     </p:spTree>
     <p:extLst>
       <p:ext uri="{BB962C8B-B14F-4D97-AF65-F5344CB8AC3E}">
@@ -15679,7 +15576,7 @@
         </p:nvSpPr>
         <p:spPr>
           <a:xfrm>
-            <a:off x="0" y="5734045"/>
+            <a:off x="0" y="5756728"/>
             <a:ext cx="12192000" cy="1145758"/>
           </a:xfrm>
           <a:prstGeom prst="snip1Rect">
@@ -16608,8 +16505,8 @@
         </p:nvGrpSpPr>
         <p:grpSpPr>
           <a:xfrm>
-            <a:off x="10595906" y="5065359"/>
-            <a:ext cx="1439999" cy="1440000"/>
+            <a:off x="10721538" y="5208088"/>
+            <a:ext cx="1097280" cy="1097280"/>
             <a:chOff x="8284765" y="4739340"/>
             <a:chExt cx="771264" cy="856371"/>
           </a:xfrm>
@@ -17253,6 +17150,68 @@
           </p:txBody>
         </p:sp>
       </p:grpSp>
+      <p:sp>
+        <p:nvSpPr>
+          <p:cNvPr id="20" name="Rectangle 19">
+            <a:extLst>
+              <a:ext uri="{FF2B5EF4-FFF2-40B4-BE49-F238E27FC236}">
+                <a16:creationId xmlns:a16="http://schemas.microsoft.com/office/drawing/2014/main" id="{21834D77-3C11-45A8-9C94-9E00F1A7553F}"/>
+              </a:ext>
+            </a:extLst>
+          </p:cNvPr>
+          <p:cNvSpPr/>
+          <p:nvPr/>
+        </p:nvSpPr>
+        <p:spPr>
+          <a:xfrm>
+            <a:off x="11350171" y="6004117"/>
+            <a:ext cx="914400" cy="914400"/>
+          </a:xfrm>
+          <a:prstGeom prst="rect">
+            <a:avLst/>
+          </a:prstGeom>
+          <a:noFill/>
+          <a:ln>
+            <a:noFill/>
+          </a:ln>
+        </p:spPr>
+        <p:style>
+          <a:lnRef idx="2">
+            <a:schemeClr val="accent1">
+              <a:shade val="50000"/>
+            </a:schemeClr>
+          </a:lnRef>
+          <a:fillRef idx="1">
+            <a:schemeClr val="accent1"/>
+          </a:fillRef>
+          <a:effectRef idx="0">
+            <a:schemeClr val="accent1"/>
+          </a:effectRef>
+          <a:fontRef idx="minor">
+            <a:schemeClr val="lt1"/>
+          </a:fontRef>
+        </p:style>
+        <p:txBody>
+          <a:bodyPr rtlCol="0" anchor="ctr"/>
+          <a:lstStyle/>
+          <a:p>
+            <a:pPr algn="ctr"/>
+            <a:r>
+              <a:rPr lang="en-US" sz="2800" dirty="0">
+                <a:solidFill>
+                  <a:schemeClr val="tx1"/>
+                </a:solidFill>
+              </a:rPr>
+              <a:t>03</a:t>
+            </a:r>
+            <a:endParaRPr lang="fr-FR" sz="2800" dirty="0">
+              <a:solidFill>
+                <a:schemeClr val="tx1"/>
+              </a:solidFill>
+            </a:endParaRPr>
+          </a:p>
+        </p:txBody>
+      </p:sp>
     </p:spTree>
     <p:extLst>
       <p:ext uri="{BB962C8B-B14F-4D97-AF65-F5344CB8AC3E}">
@@ -19272,6 +19231,130 @@
           </p:spPr>
         </p:pic>
       </p:grpSp>
+      <p:sp>
+        <p:nvSpPr>
+          <p:cNvPr id="45" name="Rectangle 44">
+            <a:extLst>
+              <a:ext uri="{FF2B5EF4-FFF2-40B4-BE49-F238E27FC236}">
+                <a16:creationId xmlns:a16="http://schemas.microsoft.com/office/drawing/2014/main" id="{E80597AF-AC48-4DB3-A124-0F2293360546}"/>
+              </a:ext>
+            </a:extLst>
+          </p:cNvPr>
+          <p:cNvSpPr/>
+          <p:nvPr/>
+        </p:nvSpPr>
+        <p:spPr>
+          <a:xfrm>
+            <a:off x="11292907" y="-79271"/>
+            <a:ext cx="914400" cy="914400"/>
+          </a:xfrm>
+          <a:prstGeom prst="rect">
+            <a:avLst/>
+          </a:prstGeom>
+          <a:noFill/>
+          <a:ln>
+            <a:noFill/>
+          </a:ln>
+        </p:spPr>
+        <p:style>
+          <a:lnRef idx="2">
+            <a:schemeClr val="accent1">
+              <a:shade val="50000"/>
+            </a:schemeClr>
+          </a:lnRef>
+          <a:fillRef idx="1">
+            <a:schemeClr val="accent1"/>
+          </a:fillRef>
+          <a:effectRef idx="0">
+            <a:schemeClr val="accent1"/>
+          </a:effectRef>
+          <a:fontRef idx="minor">
+            <a:schemeClr val="lt1"/>
+          </a:fontRef>
+        </p:style>
+        <p:txBody>
+          <a:bodyPr rtlCol="0" anchor="ctr"/>
+          <a:lstStyle/>
+          <a:p>
+            <a:pPr algn="ctr"/>
+            <a:r>
+              <a:rPr lang="en-US" sz="3600" dirty="0">
+                <a:solidFill>
+                  <a:schemeClr val="tx1"/>
+                </a:solidFill>
+              </a:rPr>
+              <a:t>2</a:t>
+            </a:r>
+            <a:endParaRPr lang="fr-FR" sz="3600" dirty="0">
+              <a:solidFill>
+                <a:schemeClr val="tx1"/>
+              </a:solidFill>
+            </a:endParaRPr>
+          </a:p>
+        </p:txBody>
+      </p:sp>
+      <p:sp>
+        <p:nvSpPr>
+          <p:cNvPr id="48" name="Rectangle 47">
+            <a:extLst>
+              <a:ext uri="{FF2B5EF4-FFF2-40B4-BE49-F238E27FC236}">
+                <a16:creationId xmlns:a16="http://schemas.microsoft.com/office/drawing/2014/main" id="{0AA2760C-3031-405B-9A10-37B7C910898E}"/>
+              </a:ext>
+            </a:extLst>
+          </p:cNvPr>
+          <p:cNvSpPr/>
+          <p:nvPr/>
+        </p:nvSpPr>
+        <p:spPr>
+          <a:xfrm>
+            <a:off x="11350171" y="6004117"/>
+            <a:ext cx="914400" cy="914400"/>
+          </a:xfrm>
+          <a:prstGeom prst="rect">
+            <a:avLst/>
+          </a:prstGeom>
+          <a:noFill/>
+          <a:ln>
+            <a:noFill/>
+          </a:ln>
+        </p:spPr>
+        <p:style>
+          <a:lnRef idx="2">
+            <a:schemeClr val="accent1">
+              <a:shade val="50000"/>
+            </a:schemeClr>
+          </a:lnRef>
+          <a:fillRef idx="1">
+            <a:schemeClr val="accent1"/>
+          </a:fillRef>
+          <a:effectRef idx="0">
+            <a:schemeClr val="accent1"/>
+          </a:effectRef>
+          <a:fontRef idx="minor">
+            <a:schemeClr val="lt1"/>
+          </a:fontRef>
+        </p:style>
+        <p:txBody>
+          <a:bodyPr rtlCol="0" anchor="ctr"/>
+          <a:lstStyle/>
+          <a:p>
+            <a:pPr algn="ctr"/>
+            <a:r>
+              <a:rPr lang="en-US" sz="2800" dirty="0">
+                <a:solidFill>
+                  <a:schemeClr val="tx1"/>
+                </a:solidFill>
+              </a:rPr>
+              <a:t>04</a:t>
+            </a:r>
+            <a:endParaRPr lang="fr-FR" sz="2800" dirty="0">
+              <a:solidFill>
+                <a:schemeClr val="tx1"/>
+              </a:solidFill>
+            </a:endParaRPr>
+          </a:p>
+        </p:txBody>
+      </p:sp>
     </p:spTree>
     <p:extLst>
       <p:ext uri="{BB962C8B-B14F-4D97-AF65-F5344CB8AC3E}">
@@ -21690,6 +21773,68 @@
           </a:p>
         </p:txBody>
       </p:sp>
+      <p:sp>
+        <p:nvSpPr>
+          <p:cNvPr id="56" name="Rectangle 55">
+            <a:extLst>
+              <a:ext uri="{FF2B5EF4-FFF2-40B4-BE49-F238E27FC236}">
+                <a16:creationId xmlns:a16="http://schemas.microsoft.com/office/drawing/2014/main" id="{3F5E4E61-FE03-4EC7-B42C-DA27F5F004E2}"/>
+              </a:ext>
+            </a:extLst>
+          </p:cNvPr>
+          <p:cNvSpPr/>
+          <p:nvPr/>
+        </p:nvSpPr>
+        <p:spPr>
+          <a:xfrm>
+            <a:off x="11350171" y="6004117"/>
+            <a:ext cx="914400" cy="914400"/>
+          </a:xfrm>
+          <a:prstGeom prst="rect">
+            <a:avLst/>
+          </a:prstGeom>
+          <a:noFill/>
+          <a:ln>
+            <a:noFill/>
+          </a:ln>
+        </p:spPr>
+        <p:style>
+          <a:lnRef idx="2">
+            <a:schemeClr val="accent1">
+              <a:shade val="50000"/>
+            </a:schemeClr>
+          </a:lnRef>
+          <a:fillRef idx="1">
+            <a:schemeClr val="accent1"/>
+          </a:fillRef>
+          <a:effectRef idx="0">
+            <a:schemeClr val="accent1"/>
+          </a:effectRef>
+          <a:fontRef idx="minor">
+            <a:schemeClr val="lt1"/>
+          </a:fontRef>
+        </p:style>
+        <p:txBody>
+          <a:bodyPr rtlCol="0" anchor="ctr"/>
+          <a:lstStyle/>
+          <a:p>
+            <a:pPr algn="ctr"/>
+            <a:r>
+              <a:rPr lang="en-US" sz="2800" dirty="0">
+                <a:solidFill>
+                  <a:schemeClr val="tx1"/>
+                </a:solidFill>
+              </a:rPr>
+              <a:t>05</a:t>
+            </a:r>
+            <a:endParaRPr lang="fr-FR" sz="2800" dirty="0">
+              <a:solidFill>
+                <a:schemeClr val="tx1"/>
+              </a:solidFill>
+            </a:endParaRPr>
+          </a:p>
+        </p:txBody>
+      </p:sp>
     </p:spTree>
     <p:extLst>
       <p:ext uri="{BB962C8B-B14F-4D97-AF65-F5344CB8AC3E}">
@@ -24191,6 +24336,68 @@
           </a:prstGeom>
         </p:spPr>
       </p:pic>
+      <p:sp>
+        <p:nvSpPr>
+          <p:cNvPr id="57" name="Rectangle 56">
+            <a:extLst>
+              <a:ext uri="{FF2B5EF4-FFF2-40B4-BE49-F238E27FC236}">
+                <a16:creationId xmlns:a16="http://schemas.microsoft.com/office/drawing/2014/main" id="{DFDC5732-7230-48DA-9AC3-4613DEF8052F}"/>
+              </a:ext>
+            </a:extLst>
+          </p:cNvPr>
+          <p:cNvSpPr/>
+          <p:nvPr/>
+        </p:nvSpPr>
+        <p:spPr>
+          <a:xfrm>
+            <a:off x="11350171" y="6004117"/>
+            <a:ext cx="914400" cy="914400"/>
+          </a:xfrm>
+          <a:prstGeom prst="rect">
+            <a:avLst/>
+          </a:prstGeom>
+          <a:noFill/>
+          <a:ln>
+            <a:noFill/>
+          </a:ln>
+        </p:spPr>
+        <p:style>
+          <a:lnRef idx="2">
+            <a:schemeClr val="accent1">
+              <a:shade val="50000"/>
+            </a:schemeClr>
+          </a:lnRef>
+          <a:fillRef idx="1">
+            <a:schemeClr val="accent1"/>
+          </a:fillRef>
+          <a:effectRef idx="0">
+            <a:schemeClr val="accent1"/>
+          </a:effectRef>
+          <a:fontRef idx="minor">
+            <a:schemeClr val="lt1"/>
+          </a:fontRef>
+        </p:style>
+        <p:txBody>
+          <a:bodyPr rtlCol="0" anchor="ctr"/>
+          <a:lstStyle/>
+          <a:p>
+            <a:pPr algn="ctr"/>
+            <a:r>
+              <a:rPr lang="en-US" sz="2800" dirty="0">
+                <a:solidFill>
+                  <a:schemeClr val="tx1"/>
+                </a:solidFill>
+              </a:rPr>
+              <a:t>06</a:t>
+            </a:r>
+            <a:endParaRPr lang="fr-FR" sz="2800" dirty="0">
+              <a:solidFill>
+                <a:schemeClr val="tx1"/>
+              </a:solidFill>
+            </a:endParaRPr>
+          </a:p>
+        </p:txBody>
+      </p:sp>
     </p:spTree>
     <p:extLst>
       <p:ext uri="{BB962C8B-B14F-4D97-AF65-F5344CB8AC3E}">
@@ -27890,6 +28097,68 @@
           </a:prstGeom>
         </p:spPr>
       </p:pic>
+      <p:sp>
+        <p:nvSpPr>
+          <p:cNvPr id="80" name="Rectangle 79">
+            <a:extLst>
+              <a:ext uri="{FF2B5EF4-FFF2-40B4-BE49-F238E27FC236}">
+                <a16:creationId xmlns:a16="http://schemas.microsoft.com/office/drawing/2014/main" id="{28F4C647-3F0E-4864-8199-848596B35D99}"/>
+              </a:ext>
+            </a:extLst>
+          </p:cNvPr>
+          <p:cNvSpPr/>
+          <p:nvPr/>
+        </p:nvSpPr>
+        <p:spPr>
+          <a:xfrm>
+            <a:off x="11350171" y="6004117"/>
+            <a:ext cx="914400" cy="914400"/>
+          </a:xfrm>
+          <a:prstGeom prst="rect">
+            <a:avLst/>
+          </a:prstGeom>
+          <a:noFill/>
+          <a:ln>
+            <a:noFill/>
+          </a:ln>
+        </p:spPr>
+        <p:style>
+          <a:lnRef idx="2">
+            <a:schemeClr val="accent1">
+              <a:shade val="50000"/>
+            </a:schemeClr>
+          </a:lnRef>
+          <a:fillRef idx="1">
+            <a:schemeClr val="accent1"/>
+          </a:fillRef>
+          <a:effectRef idx="0">
+            <a:schemeClr val="accent1"/>
+          </a:effectRef>
+          <a:fontRef idx="minor">
+            <a:schemeClr val="lt1"/>
+          </a:fontRef>
+        </p:style>
+        <p:txBody>
+          <a:bodyPr rtlCol="0" anchor="ctr"/>
+          <a:lstStyle/>
+          <a:p>
+            <a:pPr algn="ctr"/>
+            <a:r>
+              <a:rPr lang="en-US" sz="2800" dirty="0">
+                <a:solidFill>
+                  <a:schemeClr val="tx1"/>
+                </a:solidFill>
+              </a:rPr>
+              <a:t>07</a:t>
+            </a:r>
+            <a:endParaRPr lang="fr-FR" sz="2800" dirty="0">
+              <a:solidFill>
+                <a:schemeClr val="tx1"/>
+              </a:solidFill>
+            </a:endParaRPr>
+          </a:p>
+        </p:txBody>
+      </p:sp>
     </p:spTree>
     <p:extLst>
       <p:ext uri="{BB962C8B-B14F-4D97-AF65-F5344CB8AC3E}">
@@ -28723,6 +28992,68 @@
           </p:txBody>
         </p:sp>
       </p:grpSp>
+      <p:sp>
+        <p:nvSpPr>
+          <p:cNvPr id="16" name="Rectangle 15">
+            <a:extLst>
+              <a:ext uri="{FF2B5EF4-FFF2-40B4-BE49-F238E27FC236}">
+                <a16:creationId xmlns:a16="http://schemas.microsoft.com/office/drawing/2014/main" id="{88E0899E-7DEE-434B-B92F-6650A579CE19}"/>
+              </a:ext>
+            </a:extLst>
+          </p:cNvPr>
+          <p:cNvSpPr/>
+          <p:nvPr/>
+        </p:nvSpPr>
+        <p:spPr>
+          <a:xfrm>
+            <a:off x="11350171" y="6004117"/>
+            <a:ext cx="914400" cy="914400"/>
+          </a:xfrm>
+          <a:prstGeom prst="rect">
+            <a:avLst/>
+          </a:prstGeom>
+          <a:noFill/>
+          <a:ln>
+            <a:noFill/>
+          </a:ln>
+        </p:spPr>
+        <p:style>
+          <a:lnRef idx="2">
+            <a:schemeClr val="accent1">
+              <a:shade val="50000"/>
+            </a:schemeClr>
+          </a:lnRef>
+          <a:fillRef idx="1">
+            <a:schemeClr val="accent1"/>
+          </a:fillRef>
+          <a:effectRef idx="0">
+            <a:schemeClr val="accent1"/>
+          </a:effectRef>
+          <a:fontRef idx="minor">
+            <a:schemeClr val="lt1"/>
+          </a:fontRef>
+        </p:style>
+        <p:txBody>
+          <a:bodyPr rtlCol="0" anchor="ctr"/>
+          <a:lstStyle/>
+          <a:p>
+            <a:pPr algn="ctr"/>
+            <a:r>
+              <a:rPr lang="en-US" sz="2800" dirty="0">
+                <a:solidFill>
+                  <a:schemeClr val="tx1"/>
+                </a:solidFill>
+              </a:rPr>
+              <a:t>08</a:t>
+            </a:r>
+            <a:endParaRPr lang="fr-FR" sz="2800" dirty="0">
+              <a:solidFill>
+                <a:schemeClr val="tx1"/>
+              </a:solidFill>
+            </a:endParaRPr>
+          </a:p>
+        </p:txBody>
+      </p:sp>
     </p:spTree>
     <p:extLst>
       <p:ext uri="{BB962C8B-B14F-4D97-AF65-F5344CB8AC3E}">
@@ -30464,6 +30795,68 @@
           <a:p>
             <a:pPr algn="ctr"/>
             <a:endParaRPr lang="fr-FR"/>
+          </a:p>
+        </p:txBody>
+      </p:sp>
+      <p:sp>
+        <p:nvSpPr>
+          <p:cNvPr id="36" name="Rectangle 35">
+            <a:extLst>
+              <a:ext uri="{FF2B5EF4-FFF2-40B4-BE49-F238E27FC236}">
+                <a16:creationId xmlns:a16="http://schemas.microsoft.com/office/drawing/2014/main" id="{66A654BE-0446-4502-9304-14E46FFAD75B}"/>
+              </a:ext>
+            </a:extLst>
+          </p:cNvPr>
+          <p:cNvSpPr/>
+          <p:nvPr/>
+        </p:nvSpPr>
+        <p:spPr>
+          <a:xfrm>
+            <a:off x="11350171" y="6004117"/>
+            <a:ext cx="914400" cy="914400"/>
+          </a:xfrm>
+          <a:prstGeom prst="rect">
+            <a:avLst/>
+          </a:prstGeom>
+          <a:noFill/>
+          <a:ln>
+            <a:noFill/>
+          </a:ln>
+        </p:spPr>
+        <p:style>
+          <a:lnRef idx="2">
+            <a:schemeClr val="accent1">
+              <a:shade val="50000"/>
+            </a:schemeClr>
+          </a:lnRef>
+          <a:fillRef idx="1">
+            <a:schemeClr val="accent1"/>
+          </a:fillRef>
+          <a:effectRef idx="0">
+            <a:schemeClr val="accent1"/>
+          </a:effectRef>
+          <a:fontRef idx="minor">
+            <a:schemeClr val="lt1"/>
+          </a:fontRef>
+        </p:style>
+        <p:txBody>
+          <a:bodyPr rtlCol="0" anchor="ctr"/>
+          <a:lstStyle/>
+          <a:p>
+            <a:pPr algn="ctr"/>
+            <a:r>
+              <a:rPr lang="en-US" sz="2800" dirty="0">
+                <a:solidFill>
+                  <a:schemeClr val="tx1"/>
+                </a:solidFill>
+              </a:rPr>
+              <a:t>09</a:t>
+            </a:r>
+            <a:endParaRPr lang="fr-FR" sz="2800" dirty="0">
+              <a:solidFill>
+                <a:schemeClr val="tx1"/>
+              </a:solidFill>
+            </a:endParaRPr>
           </a:p>
         </p:txBody>
       </p:sp>

</xml_diff>